<commit_message>
Improved uros diagn arch diagram
Signed-off-by: Arne Nordmann (CR/AEA2) <arne.nordmann@de.bosch.com>
</commit_message>
<xml_diff>
--- a/_docs/concepts/client_library/diagnostics/diagnostics_architecture.pptx
+++ b/_docs/concepts/client_library/diagnostics/diagnostics_architecture.pptx
@@ -258,7 +258,7 @@
       </p15:sldGuideLst>
     </p:ext>
     <p:ext uri="http://customooxmlschemas.google.com/">
-      <go:slidesCustomData xmlns="" xmlns:mc="http://schemas.openxmlformats.org/markup-compatibility/2006" xmlns:mv="urn:schemas-microsoft-com:mac:vml" xmlns:c="http://schemas.openxmlformats.org/drawingml/2006/chart" xmlns:dgm="http://schemas.openxmlformats.org/drawingml/2006/diagram" xmlns:o="urn:schemas-microsoft-com:office:office" xmlns:v="urn:schemas-microsoft-com:vml" xmlns:pvml="urn:schemas-microsoft-com:office:powerpoint" xmlns:com="http://schemas.openxmlformats.org/drawingml/2006/compatibility" xmlns:p14="http://schemas.microsoft.com/office/powerpoint/2010/main" xmlns:p15="http://schemas.microsoft.com/office/powerpoint/2012/main" xmlns:go="http://customooxmlschemas.google.com/" r:id="rId8" roundtripDataSignature="AMtx7mjNETZj+lx0k8yFdZdgchI5QEOMEw=="/>
+      <go:slidesCustomData xmlns:go="http://customooxmlschemas.google.com/" xmlns:p15="http://schemas.microsoft.com/office/powerpoint/2012/main" xmlns:p14="http://schemas.microsoft.com/office/powerpoint/2010/main" xmlns:com="http://schemas.openxmlformats.org/drawingml/2006/compatibility" xmlns:pvml="urn:schemas-microsoft-com:office:powerpoint" xmlns:v="urn:schemas-microsoft-com:vml" xmlns:o="urn:schemas-microsoft-com:office:office" xmlns:dgm="http://schemas.openxmlformats.org/drawingml/2006/diagram" xmlns:c="http://schemas.openxmlformats.org/drawingml/2006/chart" xmlns:mv="urn:schemas-microsoft-com:mac:vml" xmlns:mc="http://schemas.openxmlformats.org/markup-compatibility/2006" xmlns="" r:id="rId8" roundtripDataSignature="AMtx7mjNETZj+lx0k8yFdZdgchI5QEOMEw=="/>
     </p:ext>
   </p:extLst>
 </p:presentation>
@@ -14644,7 +14644,7 @@
         </p:nvSpPr>
         <p:spPr>
           <a:xfrm>
-            <a:off x="4669669" y="3246051"/>
+            <a:off x="4675346" y="3250594"/>
             <a:ext cx="967687" cy="483843"/>
           </a:xfrm>
           <a:prstGeom prst="rect">
@@ -14836,236 +14836,6 @@
       </p:sp>
       <p:sp>
         <p:nvSpPr>
-          <p:cNvPr id="61" name="Freeform 52">
-            <a:extLst>
-              <a:ext uri="{FF2B5EF4-FFF2-40B4-BE49-F238E27FC236}">
-                <a16:creationId xmlns:a16="http://schemas.microsoft.com/office/drawing/2014/main" id="{C3991965-0826-48A7-96F8-0BEDB50B15EA}"/>
-              </a:ext>
-            </a:extLst>
-          </p:cNvPr>
-          <p:cNvSpPr/>
-          <p:nvPr/>
-        </p:nvSpPr>
-        <p:spPr>
-          <a:xfrm>
-            <a:off x="3791590" y="4738855"/>
-            <a:ext cx="659778" cy="178524"/>
-          </a:xfrm>
-          <a:custGeom>
-            <a:avLst/>
-            <a:gdLst>
-              <a:gd name="connsiteX0" fmla="*/ 0 w 1089660"/>
-              <a:gd name="connsiteY0" fmla="*/ 101558 h 194715"/>
-              <a:gd name="connsiteX1" fmla="*/ 327660 w 1089660"/>
-              <a:gd name="connsiteY1" fmla="*/ 2498 h 194715"/>
-              <a:gd name="connsiteX2" fmla="*/ 693420 w 1089660"/>
-              <a:gd name="connsiteY2" fmla="*/ 192998 h 194715"/>
-              <a:gd name="connsiteX3" fmla="*/ 1089660 w 1089660"/>
-              <a:gd name="connsiteY3" fmla="*/ 101558 h 194715"/>
-              <a:gd name="connsiteX4" fmla="*/ 1089660 w 1089660"/>
-              <a:gd name="connsiteY4" fmla="*/ 101558 h 194715"/>
-              <a:gd name="connsiteX5" fmla="*/ 1089660 w 1089660"/>
-              <a:gd name="connsiteY5" fmla="*/ 101558 h 194715"/>
-              <a:gd name="connsiteX0" fmla="*/ 0 w 1089660"/>
-              <a:gd name="connsiteY0" fmla="*/ 70227 h 162487"/>
-              <a:gd name="connsiteX1" fmla="*/ 313195 w 1089660"/>
-              <a:gd name="connsiteY1" fmla="*/ 4504 h 162487"/>
-              <a:gd name="connsiteX2" fmla="*/ 693420 w 1089660"/>
-              <a:gd name="connsiteY2" fmla="*/ 161667 h 162487"/>
-              <a:gd name="connsiteX3" fmla="*/ 1089660 w 1089660"/>
-              <a:gd name="connsiteY3" fmla="*/ 70227 h 162487"/>
-              <a:gd name="connsiteX4" fmla="*/ 1089660 w 1089660"/>
-              <a:gd name="connsiteY4" fmla="*/ 70227 h 162487"/>
-              <a:gd name="connsiteX5" fmla="*/ 1089660 w 1089660"/>
-              <a:gd name="connsiteY5" fmla="*/ 70227 h 162487"/>
-              <a:gd name="connsiteX0" fmla="*/ 0 w 1089660"/>
-              <a:gd name="connsiteY0" fmla="*/ 70838 h 172678"/>
-              <a:gd name="connsiteX1" fmla="*/ 313195 w 1089660"/>
-              <a:gd name="connsiteY1" fmla="*/ 5115 h 172678"/>
-              <a:gd name="connsiteX2" fmla="*/ 715116 w 1089660"/>
-              <a:gd name="connsiteY2" fmla="*/ 171803 h 172678"/>
-              <a:gd name="connsiteX3" fmla="*/ 1089660 w 1089660"/>
-              <a:gd name="connsiteY3" fmla="*/ 70838 h 172678"/>
-              <a:gd name="connsiteX4" fmla="*/ 1089660 w 1089660"/>
-              <a:gd name="connsiteY4" fmla="*/ 70838 h 172678"/>
-              <a:gd name="connsiteX5" fmla="*/ 1089660 w 1089660"/>
-              <a:gd name="connsiteY5" fmla="*/ 70838 h 172678"/>
-            </a:gdLst>
-            <a:ahLst/>
-            <a:cxnLst>
-              <a:cxn ang="0">
-                <a:pos x="connsiteX0" y="connsiteY0"/>
-              </a:cxn>
-              <a:cxn ang="0">
-                <a:pos x="connsiteX1" y="connsiteY1"/>
-              </a:cxn>
-              <a:cxn ang="0">
-                <a:pos x="connsiteX2" y="connsiteY2"/>
-              </a:cxn>
-              <a:cxn ang="0">
-                <a:pos x="connsiteX3" y="connsiteY3"/>
-              </a:cxn>
-              <a:cxn ang="0">
-                <a:pos x="connsiteX4" y="connsiteY4"/>
-              </a:cxn>
-              <a:cxn ang="0">
-                <a:pos x="connsiteX5" y="connsiteY5"/>
-              </a:cxn>
-            </a:cxnLst>
-            <a:rect l="l" t="t" r="r" b="b"/>
-            <a:pathLst>
-              <a:path w="1089660" h="172678">
-                <a:moveTo>
-                  <a:pt x="0" y="70838"/>
-                </a:moveTo>
-                <a:cubicBezTo>
-                  <a:pt x="106045" y="13688"/>
-                  <a:pt x="194009" y="-11712"/>
-                  <a:pt x="313195" y="5115"/>
-                </a:cubicBezTo>
-                <a:cubicBezTo>
-                  <a:pt x="432381" y="21942"/>
-                  <a:pt x="585705" y="160849"/>
-                  <a:pt x="715116" y="171803"/>
-                </a:cubicBezTo>
-                <a:cubicBezTo>
-                  <a:pt x="844527" y="182757"/>
-                  <a:pt x="1027236" y="87666"/>
-                  <a:pt x="1089660" y="70838"/>
-                </a:cubicBezTo>
-                <a:lnTo>
-                  <a:pt x="1089660" y="70838"/>
-                </a:lnTo>
-                <a:lnTo>
-                  <a:pt x="1089660" y="70838"/>
-                </a:lnTo>
-              </a:path>
-            </a:pathLst>
-          </a:custGeom>
-          <a:noFill/>
-          <a:ln w="28575" cap="flat" cmpd="sng" algn="ctr">
-            <a:solidFill>
-              <a:srgbClr val="000000"/>
-            </a:solidFill>
-            <a:prstDash val="sysDash"/>
-          </a:ln>
-          <a:effectLst/>
-        </p:spPr>
-        <p:txBody>
-          <a:bodyPr rtlCol="0" anchor="ctr"/>
-          <a:lstStyle>
-            <a:defPPr>
-              <a:defRPr lang="en-US"/>
-            </a:defPPr>
-            <a:lvl1pPr marL="0" algn="l" defTabSz="914400" rtl="0" eaLnBrk="1" latinLnBrk="0" hangingPunct="1">
-              <a:defRPr sz="1800" kern="1200">
-                <a:solidFill>
-                  <a:schemeClr val="lt1"/>
-                </a:solidFill>
-                <a:latin typeface="+mn-lt"/>
-                <a:ea typeface="+mn-ea"/>
-                <a:cs typeface="+mn-cs"/>
-              </a:defRPr>
-            </a:lvl1pPr>
-            <a:lvl2pPr marL="457200" algn="l" defTabSz="914400" rtl="0" eaLnBrk="1" latinLnBrk="0" hangingPunct="1">
-              <a:defRPr sz="1800" kern="1200">
-                <a:solidFill>
-                  <a:schemeClr val="lt1"/>
-                </a:solidFill>
-                <a:latin typeface="+mn-lt"/>
-                <a:ea typeface="+mn-ea"/>
-                <a:cs typeface="+mn-cs"/>
-              </a:defRPr>
-            </a:lvl2pPr>
-            <a:lvl3pPr marL="914400" algn="l" defTabSz="914400" rtl="0" eaLnBrk="1" latinLnBrk="0" hangingPunct="1">
-              <a:defRPr sz="1800" kern="1200">
-                <a:solidFill>
-                  <a:schemeClr val="lt1"/>
-                </a:solidFill>
-                <a:latin typeface="+mn-lt"/>
-                <a:ea typeface="+mn-ea"/>
-                <a:cs typeface="+mn-cs"/>
-              </a:defRPr>
-            </a:lvl3pPr>
-            <a:lvl4pPr marL="1371600" algn="l" defTabSz="914400" rtl="0" eaLnBrk="1" latinLnBrk="0" hangingPunct="1">
-              <a:defRPr sz="1800" kern="1200">
-                <a:solidFill>
-                  <a:schemeClr val="lt1"/>
-                </a:solidFill>
-                <a:latin typeface="+mn-lt"/>
-                <a:ea typeface="+mn-ea"/>
-                <a:cs typeface="+mn-cs"/>
-              </a:defRPr>
-            </a:lvl4pPr>
-            <a:lvl5pPr marL="1828800" algn="l" defTabSz="914400" rtl="0" eaLnBrk="1" latinLnBrk="0" hangingPunct="1">
-              <a:defRPr sz="1800" kern="1200">
-                <a:solidFill>
-                  <a:schemeClr val="lt1"/>
-                </a:solidFill>
-                <a:latin typeface="+mn-lt"/>
-                <a:ea typeface="+mn-ea"/>
-                <a:cs typeface="+mn-cs"/>
-              </a:defRPr>
-            </a:lvl5pPr>
-            <a:lvl6pPr marL="2286000" algn="l" defTabSz="914400" rtl="0" eaLnBrk="1" latinLnBrk="0" hangingPunct="1">
-              <a:defRPr sz="1800" kern="1200">
-                <a:solidFill>
-                  <a:schemeClr val="lt1"/>
-                </a:solidFill>
-                <a:latin typeface="+mn-lt"/>
-                <a:ea typeface="+mn-ea"/>
-                <a:cs typeface="+mn-cs"/>
-              </a:defRPr>
-            </a:lvl6pPr>
-            <a:lvl7pPr marL="2743200" algn="l" defTabSz="914400" rtl="0" eaLnBrk="1" latinLnBrk="0" hangingPunct="1">
-              <a:defRPr sz="1800" kern="1200">
-                <a:solidFill>
-                  <a:schemeClr val="lt1"/>
-                </a:solidFill>
-                <a:latin typeface="+mn-lt"/>
-                <a:ea typeface="+mn-ea"/>
-                <a:cs typeface="+mn-cs"/>
-              </a:defRPr>
-            </a:lvl7pPr>
-            <a:lvl8pPr marL="3200400" algn="l" defTabSz="914400" rtl="0" eaLnBrk="1" latinLnBrk="0" hangingPunct="1">
-              <a:defRPr sz="1800" kern="1200">
-                <a:solidFill>
-                  <a:schemeClr val="lt1"/>
-                </a:solidFill>
-                <a:latin typeface="+mn-lt"/>
-                <a:ea typeface="+mn-ea"/>
-                <a:cs typeface="+mn-cs"/>
-              </a:defRPr>
-            </a:lvl8pPr>
-            <a:lvl9pPr marL="3657600" algn="l" defTabSz="914400" rtl="0" eaLnBrk="1" latinLnBrk="0" hangingPunct="1">
-              <a:defRPr sz="1800" kern="1200">
-                <a:solidFill>
-                  <a:schemeClr val="lt1"/>
-                </a:solidFill>
-                <a:latin typeface="+mn-lt"/>
-                <a:ea typeface="+mn-ea"/>
-                <a:cs typeface="+mn-cs"/>
-              </a:defRPr>
-            </a:lvl9pPr>
-          </a:lstStyle>
-          <a:p>
-            <a:pPr algn="ctr" defTabSz="822564">
-              <a:buClrTx/>
-              <a:buFontTx/>
-              <a:buNone/>
-              <a:defRPr/>
-            </a:pPr>
-            <a:endParaRPr lang="en-US" sz="2159">
-              <a:solidFill>
-                <a:srgbClr val="FFFFFF"/>
-              </a:solidFill>
-              <a:latin typeface="Calibri" panose="020F0502020204030204"/>
-            </a:endParaRPr>
-          </a:p>
-        </p:txBody>
-      </p:sp>
-      <p:sp>
-        <p:nvSpPr>
           <p:cNvPr id="71" name="Rectangle 70">
             <a:extLst>
               <a:ext uri="{FF2B5EF4-FFF2-40B4-BE49-F238E27FC236}">
@@ -15078,7 +14848,7 @@
         </p:nvSpPr>
         <p:spPr>
           <a:xfrm>
-            <a:off x="4455199" y="5051797"/>
+            <a:off x="4677449" y="5051797"/>
             <a:ext cx="3275247" cy="74437"/>
           </a:xfrm>
           <a:prstGeom prst="rect">
@@ -15219,7 +14989,7 @@
         </p:nvSpPr>
         <p:spPr>
           <a:xfrm>
-            <a:off x="4455199" y="4089222"/>
+            <a:off x="4677449" y="4089222"/>
             <a:ext cx="3275247" cy="74437"/>
           </a:xfrm>
           <a:prstGeom prst="rect">
@@ -15360,7 +15130,7 @@
         </p:nvSpPr>
         <p:spPr>
           <a:xfrm>
-            <a:off x="6468923" y="3246050"/>
+            <a:off x="6012711" y="3252955"/>
             <a:ext cx="967687" cy="483843"/>
           </a:xfrm>
           <a:prstGeom prst="rect">
@@ -15737,179 +15507,6 @@
       </p:sp>
       <p:sp>
         <p:nvSpPr>
-          <p:cNvPr id="76" name="TextBox 78">
-            <a:extLst>
-              <a:ext uri="{FF2B5EF4-FFF2-40B4-BE49-F238E27FC236}">
-                <a16:creationId xmlns:a16="http://schemas.microsoft.com/office/drawing/2014/main" id="{7397B02E-5C68-4DF9-B83C-84914DABD04D}"/>
-              </a:ext>
-            </a:extLst>
-          </p:cNvPr>
-          <p:cNvSpPr txBox="1"/>
-          <p:nvPr/>
-        </p:nvSpPr>
-        <p:spPr>
-          <a:xfrm>
-            <a:off x="3793414" y="4880763"/>
-            <a:ext cx="681597" cy="507831"/>
-          </a:xfrm>
-          <a:prstGeom prst="rect">
-            <a:avLst/>
-          </a:prstGeom>
-          <a:noFill/>
-        </p:spPr>
-        <p:txBody>
-          <a:bodyPr wrap="none" rtlCol="0">
-            <a:spAutoFit/>
-          </a:bodyPr>
-          <a:lstStyle>
-            <a:defPPr>
-              <a:defRPr lang="en-US"/>
-            </a:defPPr>
-            <a:lvl1pPr marL="0" algn="l" defTabSz="914400" rtl="0" eaLnBrk="1" latinLnBrk="0" hangingPunct="1">
-              <a:defRPr sz="1800" kern="1200">
-                <a:solidFill>
-                  <a:schemeClr val="tx1"/>
-                </a:solidFill>
-                <a:latin typeface="+mn-lt"/>
-                <a:ea typeface="+mn-ea"/>
-                <a:cs typeface="+mn-cs"/>
-              </a:defRPr>
-            </a:lvl1pPr>
-            <a:lvl2pPr marL="457200" algn="l" defTabSz="914400" rtl="0" eaLnBrk="1" latinLnBrk="0" hangingPunct="1">
-              <a:defRPr sz="1800" kern="1200">
-                <a:solidFill>
-                  <a:schemeClr val="tx1"/>
-                </a:solidFill>
-                <a:latin typeface="+mn-lt"/>
-                <a:ea typeface="+mn-ea"/>
-                <a:cs typeface="+mn-cs"/>
-              </a:defRPr>
-            </a:lvl2pPr>
-            <a:lvl3pPr marL="914400" algn="l" defTabSz="914400" rtl="0" eaLnBrk="1" latinLnBrk="0" hangingPunct="1">
-              <a:defRPr sz="1800" kern="1200">
-                <a:solidFill>
-                  <a:schemeClr val="tx1"/>
-                </a:solidFill>
-                <a:latin typeface="+mn-lt"/>
-                <a:ea typeface="+mn-ea"/>
-                <a:cs typeface="+mn-cs"/>
-              </a:defRPr>
-            </a:lvl3pPr>
-            <a:lvl4pPr marL="1371600" algn="l" defTabSz="914400" rtl="0" eaLnBrk="1" latinLnBrk="0" hangingPunct="1">
-              <a:defRPr sz="1800" kern="1200">
-                <a:solidFill>
-                  <a:schemeClr val="tx1"/>
-                </a:solidFill>
-                <a:latin typeface="+mn-lt"/>
-                <a:ea typeface="+mn-ea"/>
-                <a:cs typeface="+mn-cs"/>
-              </a:defRPr>
-            </a:lvl4pPr>
-            <a:lvl5pPr marL="1828800" algn="l" defTabSz="914400" rtl="0" eaLnBrk="1" latinLnBrk="0" hangingPunct="1">
-              <a:defRPr sz="1800" kern="1200">
-                <a:solidFill>
-                  <a:schemeClr val="tx1"/>
-                </a:solidFill>
-                <a:latin typeface="+mn-lt"/>
-                <a:ea typeface="+mn-ea"/>
-                <a:cs typeface="+mn-cs"/>
-              </a:defRPr>
-            </a:lvl5pPr>
-            <a:lvl6pPr marL="2286000" algn="l" defTabSz="914400" rtl="0" eaLnBrk="1" latinLnBrk="0" hangingPunct="1">
-              <a:defRPr sz="1800" kern="1200">
-                <a:solidFill>
-                  <a:schemeClr val="tx1"/>
-                </a:solidFill>
-                <a:latin typeface="+mn-lt"/>
-                <a:ea typeface="+mn-ea"/>
-                <a:cs typeface="+mn-cs"/>
-              </a:defRPr>
-            </a:lvl6pPr>
-            <a:lvl7pPr marL="2743200" algn="l" defTabSz="914400" rtl="0" eaLnBrk="1" latinLnBrk="0" hangingPunct="1">
-              <a:defRPr sz="1800" kern="1200">
-                <a:solidFill>
-                  <a:schemeClr val="tx1"/>
-                </a:solidFill>
-                <a:latin typeface="+mn-lt"/>
-                <a:ea typeface="+mn-ea"/>
-                <a:cs typeface="+mn-cs"/>
-              </a:defRPr>
-            </a:lvl7pPr>
-            <a:lvl8pPr marL="3200400" algn="l" defTabSz="914400" rtl="0" eaLnBrk="1" latinLnBrk="0" hangingPunct="1">
-              <a:defRPr sz="1800" kern="1200">
-                <a:solidFill>
-                  <a:schemeClr val="tx1"/>
-                </a:solidFill>
-                <a:latin typeface="+mn-lt"/>
-                <a:ea typeface="+mn-ea"/>
-                <a:cs typeface="+mn-cs"/>
-              </a:defRPr>
-            </a:lvl8pPr>
-            <a:lvl9pPr marL="3657600" algn="l" defTabSz="914400" rtl="0" eaLnBrk="1" latinLnBrk="0" hangingPunct="1">
-              <a:defRPr sz="1800" kern="1200">
-                <a:solidFill>
-                  <a:schemeClr val="tx1"/>
-                </a:solidFill>
-                <a:latin typeface="+mn-lt"/>
-                <a:ea typeface="+mn-ea"/>
-                <a:cs typeface="+mn-cs"/>
-              </a:defRPr>
-            </a:lvl9pPr>
-          </a:lstStyle>
-          <a:p>
-            <a:pPr>
-              <a:buClrTx/>
-              <a:buFontTx/>
-              <a:buNone/>
-            </a:pPr>
-            <a:r>
-              <a:rPr lang="en-US" sz="900" dirty="0">
-                <a:solidFill>
-                  <a:srgbClr val="000000"/>
-                </a:solidFill>
-                <a:latin typeface="Calibri" panose="020F0502020204030204"/>
-              </a:rPr>
-              <a:t>Ethernet,</a:t>
-            </a:r>
-            <a:br>
-              <a:rPr lang="en-US" sz="900" dirty="0">
-                <a:solidFill>
-                  <a:srgbClr val="000000"/>
-                </a:solidFill>
-                <a:latin typeface="Calibri" panose="020F0502020204030204"/>
-              </a:rPr>
-            </a:br>
-            <a:r>
-              <a:rPr lang="en-US" sz="900" dirty="0">
-                <a:solidFill>
-                  <a:srgbClr val="000000"/>
-                </a:solidFill>
-                <a:latin typeface="Calibri" panose="020F0502020204030204"/>
-              </a:rPr>
-              <a:t>Bluetooth,</a:t>
-            </a:r>
-            <a:br>
-              <a:rPr lang="en-US" sz="900" dirty="0">
-                <a:solidFill>
-                  <a:srgbClr val="000000"/>
-                </a:solidFill>
-                <a:latin typeface="Calibri" panose="020F0502020204030204"/>
-              </a:rPr>
-            </a:br>
-            <a:r>
-              <a:rPr lang="en-US" sz="900" dirty="0">
-                <a:solidFill>
-                  <a:srgbClr val="000000"/>
-                </a:solidFill>
-                <a:latin typeface="Calibri" panose="020F0502020204030204"/>
-              </a:rPr>
-              <a:t>Serial</a:t>
-            </a:r>
-          </a:p>
-        </p:txBody>
-      </p:sp>
-      <p:sp>
-        <p:nvSpPr>
           <p:cNvPr id="77" name="Rectangle 76">
             <a:extLst>
               <a:ext uri="{FF2B5EF4-FFF2-40B4-BE49-F238E27FC236}">
@@ -15922,7 +15519,7 @@
         </p:nvSpPr>
         <p:spPr>
           <a:xfrm>
-            <a:off x="2069343" y="3246051"/>
+            <a:off x="1871333" y="3252752"/>
             <a:ext cx="967687" cy="483843"/>
           </a:xfrm>
           <a:prstGeom prst="rect">
@@ -16126,7 +15723,7 @@
         </p:nvSpPr>
         <p:spPr>
           <a:xfrm>
-            <a:off x="5637355" y="3161697"/>
+            <a:off x="5411055" y="3187423"/>
             <a:ext cx="831567" cy="523220"/>
           </a:xfrm>
           <a:prstGeom prst="rect">
@@ -16271,8 +15868,8 @@
         </p:nvSpPr>
         <p:spPr>
           <a:xfrm>
-            <a:off x="4455199" y="5158463"/>
-            <a:ext cx="3275247" cy="270000"/>
+            <a:off x="4677449" y="5158463"/>
+            <a:ext cx="3447486" cy="270000"/>
           </a:xfrm>
           <a:prstGeom prst="rect">
             <a:avLst/>
@@ -16442,8 +16039,8 @@
         </p:nvSpPr>
         <p:spPr>
           <a:xfrm>
-            <a:off x="4448191" y="4543366"/>
-            <a:ext cx="3282256" cy="540000"/>
+            <a:off x="4670441" y="4543366"/>
+            <a:ext cx="3447486" cy="540000"/>
           </a:xfrm>
           <a:prstGeom prst="rect">
             <a:avLst/>
@@ -16900,8 +16497,8 @@
         </p:nvSpPr>
         <p:spPr>
           <a:xfrm>
-            <a:off x="4448191" y="3928547"/>
-            <a:ext cx="3282256" cy="551648"/>
+            <a:off x="4670440" y="3928547"/>
+            <a:ext cx="3447487" cy="551648"/>
           </a:xfrm>
           <a:prstGeom prst="rect">
             <a:avLst/>
@@ -17193,7 +16790,7 @@
         </p:nvSpPr>
         <p:spPr>
           <a:xfrm>
-            <a:off x="6468922" y="3928547"/>
+            <a:off x="6223126" y="3934808"/>
             <a:ext cx="546856" cy="148153"/>
           </a:xfrm>
           <a:prstGeom prst="rect">
@@ -17246,7 +16843,7 @@
         </p:nvSpPr>
         <p:spPr>
           <a:xfrm>
-            <a:off x="2069343" y="3928547"/>
+            <a:off x="2027772" y="3928547"/>
             <a:ext cx="654807" cy="148153"/>
           </a:xfrm>
           <a:prstGeom prst="rect">
@@ -17297,7 +16894,7 @@
         </p:nvSpPr>
         <p:spPr>
           <a:xfrm>
-            <a:off x="4669669" y="3928547"/>
+            <a:off x="4889406" y="3928547"/>
             <a:ext cx="546856" cy="148153"/>
           </a:xfrm>
           <a:prstGeom prst="rect">
@@ -17338,10 +16935,10 @@
       </p:sp>
       <p:sp>
         <p:nvSpPr>
-          <p:cNvPr id="4" name="Freeform: Shape 3">
+          <p:cNvPr id="24" name="Rectangle 23">
             <a:extLst>
               <a:ext uri="{FF2B5EF4-FFF2-40B4-BE49-F238E27FC236}">
-                <a16:creationId xmlns:a16="http://schemas.microsoft.com/office/drawing/2014/main" id="{917FE7D4-2C7D-445C-B52E-8F85C71647DD}"/>
+                <a16:creationId xmlns:a16="http://schemas.microsoft.com/office/drawing/2014/main" id="{A415CA9D-2F76-4D70-9C80-6918C9FE560B}"/>
               </a:ext>
             </a:extLst>
           </p:cNvPr>
@@ -17350,220 +16947,177 @@
         </p:nvSpPr>
         <p:spPr>
           <a:xfrm>
-            <a:off x="2374339" y="3719514"/>
-            <a:ext cx="4378649" cy="1221594"/>
+            <a:off x="7145385" y="3246051"/>
+            <a:ext cx="972542" cy="490544"/>
           </a:xfrm>
-          <a:custGeom>
+          <a:prstGeom prst="rect">
             <a:avLst/>
-            <a:gdLst>
-              <a:gd name="connsiteX0" fmla="*/ 2653990 w 2882672"/>
-              <a:gd name="connsiteY0" fmla="*/ 0 h 896469"/>
-              <a:gd name="connsiteX1" fmla="*/ 2658752 w 2882672"/>
-              <a:gd name="connsiteY1" fmla="*/ 671512 h 896469"/>
-              <a:gd name="connsiteX2" fmla="*/ 315602 w 2882672"/>
-              <a:gd name="connsiteY2" fmla="*/ 876300 h 896469"/>
-              <a:gd name="connsiteX3" fmla="*/ 87002 w 2882672"/>
-              <a:gd name="connsiteY3" fmla="*/ 242887 h 896469"/>
-              <a:gd name="connsiteX0" fmla="*/ 2617314 w 2845996"/>
-              <a:gd name="connsiteY0" fmla="*/ 0 h 896469"/>
-              <a:gd name="connsiteX1" fmla="*/ 2622076 w 2845996"/>
-              <a:gd name="connsiteY1" fmla="*/ 671512 h 896469"/>
-              <a:gd name="connsiteX2" fmla="*/ 278926 w 2845996"/>
-              <a:gd name="connsiteY2" fmla="*/ 876300 h 896469"/>
-              <a:gd name="connsiteX3" fmla="*/ 50326 w 2845996"/>
-              <a:gd name="connsiteY3" fmla="*/ 242887 h 896469"/>
-              <a:gd name="connsiteX0" fmla="*/ 2567080 w 2732015"/>
-              <a:gd name="connsiteY0" fmla="*/ 0 h 967770"/>
-              <a:gd name="connsiteX1" fmla="*/ 2571842 w 2732015"/>
-              <a:gd name="connsiteY1" fmla="*/ 671512 h 967770"/>
-              <a:gd name="connsiteX2" fmla="*/ 1157379 w 2732015"/>
-              <a:gd name="connsiteY2" fmla="*/ 952500 h 967770"/>
-              <a:gd name="connsiteX3" fmla="*/ 92 w 2732015"/>
-              <a:gd name="connsiteY3" fmla="*/ 242887 h 967770"/>
-              <a:gd name="connsiteX0" fmla="*/ 2567076 w 2732011"/>
-              <a:gd name="connsiteY0" fmla="*/ 0 h 952629"/>
-              <a:gd name="connsiteX1" fmla="*/ 2571838 w 2732011"/>
-              <a:gd name="connsiteY1" fmla="*/ 671512 h 952629"/>
-              <a:gd name="connsiteX2" fmla="*/ 1157375 w 2732011"/>
-              <a:gd name="connsiteY2" fmla="*/ 952500 h 952629"/>
-              <a:gd name="connsiteX3" fmla="*/ 88 w 2732011"/>
-              <a:gd name="connsiteY3" fmla="*/ 242887 h 952629"/>
-              <a:gd name="connsiteX0" fmla="*/ 2567076 w 2567076"/>
-              <a:gd name="connsiteY0" fmla="*/ 0 h 952500"/>
-              <a:gd name="connsiteX1" fmla="*/ 1157375 w 2567076"/>
-              <a:gd name="connsiteY1" fmla="*/ 952500 h 952500"/>
-              <a:gd name="connsiteX2" fmla="*/ 88 w 2567076"/>
-              <a:gd name="connsiteY2" fmla="*/ 242887 h 952500"/>
-              <a:gd name="connsiteX0" fmla="*/ 2567076 w 2567389"/>
-              <a:gd name="connsiteY0" fmla="*/ 0 h 952500"/>
-              <a:gd name="connsiteX1" fmla="*/ 1157375 w 2567389"/>
-              <a:gd name="connsiteY1" fmla="*/ 952500 h 952500"/>
-              <a:gd name="connsiteX2" fmla="*/ 88 w 2567389"/>
-              <a:gd name="connsiteY2" fmla="*/ 242887 h 952500"/>
-              <a:gd name="connsiteX0" fmla="*/ 2567076 w 2567390"/>
-              <a:gd name="connsiteY0" fmla="*/ 0 h 952558"/>
-              <a:gd name="connsiteX1" fmla="*/ 1157375 w 2567390"/>
-              <a:gd name="connsiteY1" fmla="*/ 952500 h 952558"/>
-              <a:gd name="connsiteX2" fmla="*/ 88 w 2567390"/>
-              <a:gd name="connsiteY2" fmla="*/ 242887 h 952558"/>
-              <a:gd name="connsiteX0" fmla="*/ 2567076 w 2567076"/>
-              <a:gd name="connsiteY0" fmla="*/ 0 h 976463"/>
-              <a:gd name="connsiteX1" fmla="*/ 1157375 w 2567076"/>
-              <a:gd name="connsiteY1" fmla="*/ 952500 h 976463"/>
-              <a:gd name="connsiteX2" fmla="*/ 88 w 2567076"/>
-              <a:gd name="connsiteY2" fmla="*/ 242887 h 976463"/>
-              <a:gd name="connsiteX0" fmla="*/ 2566988 w 2566988"/>
-              <a:gd name="connsiteY0" fmla="*/ 0 h 976463"/>
-              <a:gd name="connsiteX1" fmla="*/ 1157287 w 2566988"/>
-              <a:gd name="connsiteY1" fmla="*/ 952500 h 976463"/>
-              <a:gd name="connsiteX2" fmla="*/ 0 w 2566988"/>
-              <a:gd name="connsiteY2" fmla="*/ 242887 h 976463"/>
-              <a:gd name="connsiteX0" fmla="*/ 2566988 w 2566988"/>
-              <a:gd name="connsiteY0" fmla="*/ 0 h 999455"/>
-              <a:gd name="connsiteX1" fmla="*/ 1119187 w 2566988"/>
-              <a:gd name="connsiteY1" fmla="*/ 981075 h 999455"/>
-              <a:gd name="connsiteX2" fmla="*/ 0 w 2566988"/>
-              <a:gd name="connsiteY2" fmla="*/ 242887 h 999455"/>
-              <a:gd name="connsiteX0" fmla="*/ 2566988 w 2566988"/>
-              <a:gd name="connsiteY0" fmla="*/ 0 h 999303"/>
-              <a:gd name="connsiteX1" fmla="*/ 1119187 w 2566988"/>
-              <a:gd name="connsiteY1" fmla="*/ 981075 h 999303"/>
-              <a:gd name="connsiteX2" fmla="*/ 0 w 2566988"/>
-              <a:gd name="connsiteY2" fmla="*/ 242887 h 999303"/>
-              <a:gd name="connsiteX0" fmla="*/ 2566988 w 2566988"/>
-              <a:gd name="connsiteY0" fmla="*/ 0 h 999303"/>
-              <a:gd name="connsiteX1" fmla="*/ 1119187 w 2566988"/>
-              <a:gd name="connsiteY1" fmla="*/ 981075 h 999303"/>
-              <a:gd name="connsiteX2" fmla="*/ 0 w 2566988"/>
-              <a:gd name="connsiteY2" fmla="*/ 242887 h 999303"/>
-              <a:gd name="connsiteX0" fmla="*/ 2566988 w 2567163"/>
-              <a:gd name="connsiteY0" fmla="*/ 0 h 983879"/>
-              <a:gd name="connsiteX1" fmla="*/ 1119187 w 2567163"/>
-              <a:gd name="connsiteY1" fmla="*/ 981075 h 983879"/>
-              <a:gd name="connsiteX2" fmla="*/ 0 w 2567163"/>
-              <a:gd name="connsiteY2" fmla="*/ 242887 h 983879"/>
-              <a:gd name="connsiteX0" fmla="*/ 2567269 w 2567444"/>
-              <a:gd name="connsiteY0" fmla="*/ 0 h 984811"/>
-              <a:gd name="connsiteX1" fmla="*/ 1119468 w 2567444"/>
-              <a:gd name="connsiteY1" fmla="*/ 981075 h 984811"/>
-              <a:gd name="connsiteX2" fmla="*/ 281 w 2567444"/>
-              <a:gd name="connsiteY2" fmla="*/ 242887 h 984811"/>
-              <a:gd name="connsiteX0" fmla="*/ 2568071 w 2568246"/>
-              <a:gd name="connsiteY0" fmla="*/ 0 h 995969"/>
-              <a:gd name="connsiteX1" fmla="*/ 1120270 w 2568246"/>
-              <a:gd name="connsiteY1" fmla="*/ 981075 h 995969"/>
-              <a:gd name="connsiteX2" fmla="*/ 1083 w 2568246"/>
-              <a:gd name="connsiteY2" fmla="*/ 242887 h 995969"/>
-              <a:gd name="connsiteX0" fmla="*/ 2568196 w 2568359"/>
-              <a:gd name="connsiteY0" fmla="*/ 0 h 1077758"/>
-              <a:gd name="connsiteX1" fmla="*/ 1039385 w 2568359"/>
-              <a:gd name="connsiteY1" fmla="*/ 1076325 h 1077758"/>
-              <a:gd name="connsiteX2" fmla="*/ 1208 w 2568359"/>
-              <a:gd name="connsiteY2" fmla="*/ 242887 h 1077758"/>
-              <a:gd name="connsiteX0" fmla="*/ 2568246 w 2568413"/>
-              <a:gd name="connsiteY0" fmla="*/ 0 h 1217060"/>
-              <a:gd name="connsiteX1" fmla="*/ 1039435 w 2568413"/>
-              <a:gd name="connsiteY1" fmla="*/ 1190625 h 1217060"/>
-              <a:gd name="connsiteX2" fmla="*/ 1258 w 2568413"/>
-              <a:gd name="connsiteY2" fmla="*/ 357187 h 1217060"/>
-              <a:gd name="connsiteX0" fmla="*/ 2568246 w 2568283"/>
-              <a:gd name="connsiteY0" fmla="*/ 0 h 1217060"/>
-              <a:gd name="connsiteX1" fmla="*/ 1039435 w 2568283"/>
-              <a:gd name="connsiteY1" fmla="*/ 1190625 h 1217060"/>
-              <a:gd name="connsiteX2" fmla="*/ 1258 w 2568283"/>
-              <a:gd name="connsiteY2" fmla="*/ 357187 h 1217060"/>
-              <a:gd name="connsiteX0" fmla="*/ 2568253 w 2568290"/>
-              <a:gd name="connsiteY0" fmla="*/ 0 h 1194620"/>
-              <a:gd name="connsiteX1" fmla="*/ 1039442 w 2568290"/>
-              <a:gd name="connsiteY1" fmla="*/ 1190625 h 1194620"/>
-              <a:gd name="connsiteX2" fmla="*/ 1265 w 2568290"/>
-              <a:gd name="connsiteY2" fmla="*/ 357187 h 1194620"/>
-              <a:gd name="connsiteX0" fmla="*/ 2568239 w 2568276"/>
-              <a:gd name="connsiteY0" fmla="*/ 0 h 1199980"/>
-              <a:gd name="connsiteX1" fmla="*/ 1039428 w 2568276"/>
-              <a:gd name="connsiteY1" fmla="*/ 1190625 h 1199980"/>
-              <a:gd name="connsiteX2" fmla="*/ 1251 w 2568276"/>
-              <a:gd name="connsiteY2" fmla="*/ 357187 h 1199980"/>
-              <a:gd name="connsiteX0" fmla="*/ 2568248 w 2568285"/>
-              <a:gd name="connsiteY0" fmla="*/ 0 h 1221594"/>
-              <a:gd name="connsiteX1" fmla="*/ 1033850 w 2568285"/>
-              <a:gd name="connsiteY1" fmla="*/ 1214437 h 1221594"/>
-              <a:gd name="connsiteX2" fmla="*/ 1260 w 2568285"/>
-              <a:gd name="connsiteY2" fmla="*/ 357187 h 1221594"/>
-            </a:gdLst>
-            <a:ahLst/>
-            <a:cxnLst>
-              <a:cxn ang="0">
-                <a:pos x="connsiteX0" y="connsiteY0"/>
-              </a:cxn>
-              <a:cxn ang="0">
-                <a:pos x="connsiteX1" y="connsiteY1"/>
-              </a:cxn>
-              <a:cxn ang="0">
-                <a:pos x="connsiteX2" y="connsiteY2"/>
-              </a:cxn>
-            </a:cxnLst>
-            <a:rect l="l" t="t" r="r" b="b"/>
-            <a:pathLst>
-              <a:path w="2568285" h="1221594">
-                <a:moveTo>
-                  <a:pt x="2568248" y="0"/>
-                </a:moveTo>
-                <a:cubicBezTo>
-                  <a:pt x="2575743" y="1308100"/>
-                  <a:pt x="1455772" y="1197778"/>
-                  <a:pt x="1033850" y="1214437"/>
-                </a:cubicBezTo>
-                <a:cubicBezTo>
-                  <a:pt x="610284" y="1231161"/>
-                  <a:pt x="-32262" y="1290638"/>
-                  <a:pt x="1260" y="357187"/>
-                </a:cubicBezTo>
-              </a:path>
-            </a:pathLst>
-          </a:custGeom>
-          <a:noFill/>
-          <a:ln w="57150">
+          </a:prstGeom>
+          <a:solidFill>
+            <a:srgbClr val="324D7A"/>
+          </a:solidFill>
+          <a:ln w="19050" cap="flat" cmpd="sng" algn="ctr">
             <a:solidFill>
-              <a:srgbClr val="92D050">
-                <a:alpha val="85098"/>
-              </a:srgbClr>
+              <a:srgbClr val="1F314F"/>
             </a:solidFill>
-            <a:headEnd type="none" w="med" len="med"/>
-            <a:tailEnd type="triangle" w="med" len="med"/>
+            <a:prstDash val="solid"/>
+            <a:miter lim="800000"/>
           </a:ln>
+          <a:effectLst/>
         </p:spPr>
-        <p:style>
-          <a:lnRef idx="2">
-            <a:schemeClr val="accent1">
-              <a:shade val="50000"/>
-            </a:schemeClr>
-          </a:lnRef>
-          <a:fillRef idx="1">
-            <a:schemeClr val="accent1"/>
-          </a:fillRef>
-          <a:effectRef idx="0">
-            <a:schemeClr val="accent1"/>
-          </a:effectRef>
-          <a:fontRef idx="minor">
-            <a:schemeClr val="lt1"/>
-          </a:fontRef>
-        </p:style>
         <p:txBody>
-          <a:bodyPr rtlCol="0" anchor="ctr"/>
-          <a:lstStyle/>
+          <a:bodyPr lIns="0" tIns="0" rIns="0" bIns="0" rtlCol="0" anchor="ctr"/>
+          <a:lstStyle>
+            <a:defPPr>
+              <a:defRPr lang="en-US"/>
+            </a:defPPr>
+            <a:lvl1pPr marL="0" algn="l" defTabSz="914400" rtl="0" eaLnBrk="1" latinLnBrk="0" hangingPunct="1">
+              <a:defRPr sz="1800" kern="1200">
+                <a:solidFill>
+                  <a:schemeClr val="tx1"/>
+                </a:solidFill>
+                <a:latin typeface="+mn-lt"/>
+                <a:ea typeface="+mn-ea"/>
+                <a:cs typeface="+mn-cs"/>
+              </a:defRPr>
+            </a:lvl1pPr>
+            <a:lvl2pPr marL="457200" algn="l" defTabSz="914400" rtl="0" eaLnBrk="1" latinLnBrk="0" hangingPunct="1">
+              <a:defRPr sz="1800" kern="1200">
+                <a:solidFill>
+                  <a:schemeClr val="tx1"/>
+                </a:solidFill>
+                <a:latin typeface="+mn-lt"/>
+                <a:ea typeface="+mn-ea"/>
+                <a:cs typeface="+mn-cs"/>
+              </a:defRPr>
+            </a:lvl2pPr>
+            <a:lvl3pPr marL="914400" algn="l" defTabSz="914400" rtl="0" eaLnBrk="1" latinLnBrk="0" hangingPunct="1">
+              <a:defRPr sz="1800" kern="1200">
+                <a:solidFill>
+                  <a:schemeClr val="tx1"/>
+                </a:solidFill>
+                <a:latin typeface="+mn-lt"/>
+                <a:ea typeface="+mn-ea"/>
+                <a:cs typeface="+mn-cs"/>
+              </a:defRPr>
+            </a:lvl3pPr>
+            <a:lvl4pPr marL="1371600" algn="l" defTabSz="914400" rtl="0" eaLnBrk="1" latinLnBrk="0" hangingPunct="1">
+              <a:defRPr sz="1800" kern="1200">
+                <a:solidFill>
+                  <a:schemeClr val="tx1"/>
+                </a:solidFill>
+                <a:latin typeface="+mn-lt"/>
+                <a:ea typeface="+mn-ea"/>
+                <a:cs typeface="+mn-cs"/>
+              </a:defRPr>
+            </a:lvl4pPr>
+            <a:lvl5pPr marL="1828800" algn="l" defTabSz="914400" rtl="0" eaLnBrk="1" latinLnBrk="0" hangingPunct="1">
+              <a:defRPr sz="1800" kern="1200">
+                <a:solidFill>
+                  <a:schemeClr val="tx1"/>
+                </a:solidFill>
+                <a:latin typeface="+mn-lt"/>
+                <a:ea typeface="+mn-ea"/>
+                <a:cs typeface="+mn-cs"/>
+              </a:defRPr>
+            </a:lvl5pPr>
+            <a:lvl6pPr marL="2286000" algn="l" defTabSz="914400" rtl="0" eaLnBrk="1" latinLnBrk="0" hangingPunct="1">
+              <a:defRPr sz="1800" kern="1200">
+                <a:solidFill>
+                  <a:schemeClr val="tx1"/>
+                </a:solidFill>
+                <a:latin typeface="+mn-lt"/>
+                <a:ea typeface="+mn-ea"/>
+                <a:cs typeface="+mn-cs"/>
+              </a:defRPr>
+            </a:lvl6pPr>
+            <a:lvl7pPr marL="2743200" algn="l" defTabSz="914400" rtl="0" eaLnBrk="1" latinLnBrk="0" hangingPunct="1">
+              <a:defRPr sz="1800" kern="1200">
+                <a:solidFill>
+                  <a:schemeClr val="tx1"/>
+                </a:solidFill>
+                <a:latin typeface="+mn-lt"/>
+                <a:ea typeface="+mn-ea"/>
+                <a:cs typeface="+mn-cs"/>
+              </a:defRPr>
+            </a:lvl7pPr>
+            <a:lvl8pPr marL="3200400" algn="l" defTabSz="914400" rtl="0" eaLnBrk="1" latinLnBrk="0" hangingPunct="1">
+              <a:defRPr sz="1800" kern="1200">
+                <a:solidFill>
+                  <a:schemeClr val="tx1"/>
+                </a:solidFill>
+                <a:latin typeface="+mn-lt"/>
+                <a:ea typeface="+mn-ea"/>
+                <a:cs typeface="+mn-cs"/>
+              </a:defRPr>
+            </a:lvl8pPr>
+            <a:lvl9pPr marL="3657600" algn="l" defTabSz="914400" rtl="0" eaLnBrk="1" latinLnBrk="0" hangingPunct="1">
+              <a:defRPr sz="1800" kern="1200">
+                <a:solidFill>
+                  <a:schemeClr val="tx1"/>
+                </a:solidFill>
+                <a:latin typeface="+mn-lt"/>
+                <a:ea typeface="+mn-ea"/>
+                <a:cs typeface="+mn-cs"/>
+              </a:defRPr>
+            </a:lvl9pPr>
+          </a:lstStyle>
           <a:p>
-            <a:pPr algn="ctr"/>
-            <a:endParaRPr lang="en-US"/>
+            <a:pPr algn="ctr">
+              <a:buClrTx/>
+              <a:buFontTx/>
+              <a:buNone/>
+            </a:pPr>
+            <a:r>
+              <a:rPr lang="en-US" sz="1100" kern="0" dirty="0">
+                <a:solidFill>
+                  <a:prstClr val="white"/>
+                </a:solidFill>
+                <a:latin typeface="Calibri" panose="020F0502020204030204"/>
+              </a:rPr>
+              <a:t>micro-ROS</a:t>
+            </a:r>
+          </a:p>
+          <a:p>
+            <a:pPr algn="ctr">
+              <a:buClrTx/>
+              <a:buFontTx/>
+              <a:buNone/>
+            </a:pPr>
+            <a:r>
+              <a:rPr lang="en-US" sz="1100" kern="0" dirty="0">
+                <a:solidFill>
+                  <a:prstClr val="white"/>
+                </a:solidFill>
+                <a:latin typeface="Calibri" panose="020F0502020204030204"/>
+              </a:rPr>
+              <a:t>common</a:t>
+            </a:r>
+          </a:p>
+          <a:p>
+            <a:pPr algn="ctr">
+              <a:buClrTx/>
+              <a:buFontTx/>
+              <a:buNone/>
+            </a:pPr>
+            <a:r>
+              <a:rPr lang="en-US" sz="1100" kern="0" dirty="0">
+                <a:solidFill>
+                  <a:prstClr val="white"/>
+                </a:solidFill>
+                <a:latin typeface="Calibri" panose="020F0502020204030204"/>
+              </a:rPr>
+              <a:t>diagnostics</a:t>
+            </a:r>
           </a:p>
         </p:txBody>
       </p:sp>
       <p:sp>
         <p:nvSpPr>
-          <p:cNvPr id="38" name="Freeform: Shape 37">
+          <p:cNvPr id="25" name="Rectangle 24">
             <a:extLst>
               <a:ext uri="{FF2B5EF4-FFF2-40B4-BE49-F238E27FC236}">
-                <a16:creationId xmlns:a16="http://schemas.microsoft.com/office/drawing/2014/main" id="{68E8051F-ACDC-4332-8516-C75CF8F54D92}"/>
+                <a16:creationId xmlns:a16="http://schemas.microsoft.com/office/drawing/2014/main" id="{D7B03E5B-A288-4B82-A9A5-E7ACA0AAB28C}"/>
               </a:ext>
             </a:extLst>
           </p:cNvPr>
@@ -17572,258 +17126,462 @@
         </p:nvSpPr>
         <p:spPr>
           <a:xfrm>
-            <a:off x="2571750" y="3698080"/>
-            <a:ext cx="2400482" cy="1155330"/>
+            <a:off x="7358228" y="3928547"/>
+            <a:ext cx="546856" cy="148153"/>
           </a:xfrm>
-          <a:custGeom>
+          <a:prstGeom prst="rect">
             <a:avLst/>
-            <a:gdLst>
-              <a:gd name="connsiteX0" fmla="*/ 2653990 w 2882672"/>
-              <a:gd name="connsiteY0" fmla="*/ 0 h 896469"/>
-              <a:gd name="connsiteX1" fmla="*/ 2658752 w 2882672"/>
-              <a:gd name="connsiteY1" fmla="*/ 671512 h 896469"/>
-              <a:gd name="connsiteX2" fmla="*/ 315602 w 2882672"/>
-              <a:gd name="connsiteY2" fmla="*/ 876300 h 896469"/>
-              <a:gd name="connsiteX3" fmla="*/ 87002 w 2882672"/>
-              <a:gd name="connsiteY3" fmla="*/ 242887 h 896469"/>
-              <a:gd name="connsiteX0" fmla="*/ 2617314 w 2845996"/>
-              <a:gd name="connsiteY0" fmla="*/ 0 h 896469"/>
-              <a:gd name="connsiteX1" fmla="*/ 2622076 w 2845996"/>
-              <a:gd name="connsiteY1" fmla="*/ 671512 h 896469"/>
-              <a:gd name="connsiteX2" fmla="*/ 278926 w 2845996"/>
-              <a:gd name="connsiteY2" fmla="*/ 876300 h 896469"/>
-              <a:gd name="connsiteX3" fmla="*/ 50326 w 2845996"/>
-              <a:gd name="connsiteY3" fmla="*/ 242887 h 896469"/>
-              <a:gd name="connsiteX0" fmla="*/ 2567080 w 2732015"/>
-              <a:gd name="connsiteY0" fmla="*/ 0 h 967770"/>
-              <a:gd name="connsiteX1" fmla="*/ 2571842 w 2732015"/>
-              <a:gd name="connsiteY1" fmla="*/ 671512 h 967770"/>
-              <a:gd name="connsiteX2" fmla="*/ 1157379 w 2732015"/>
-              <a:gd name="connsiteY2" fmla="*/ 952500 h 967770"/>
-              <a:gd name="connsiteX3" fmla="*/ 92 w 2732015"/>
-              <a:gd name="connsiteY3" fmla="*/ 242887 h 967770"/>
-              <a:gd name="connsiteX0" fmla="*/ 2567076 w 2732011"/>
-              <a:gd name="connsiteY0" fmla="*/ 0 h 952629"/>
-              <a:gd name="connsiteX1" fmla="*/ 2571838 w 2732011"/>
-              <a:gd name="connsiteY1" fmla="*/ 671512 h 952629"/>
-              <a:gd name="connsiteX2" fmla="*/ 1157375 w 2732011"/>
-              <a:gd name="connsiteY2" fmla="*/ 952500 h 952629"/>
-              <a:gd name="connsiteX3" fmla="*/ 88 w 2732011"/>
-              <a:gd name="connsiteY3" fmla="*/ 242887 h 952629"/>
-              <a:gd name="connsiteX0" fmla="*/ 2567076 w 2567076"/>
-              <a:gd name="connsiteY0" fmla="*/ 0 h 952500"/>
-              <a:gd name="connsiteX1" fmla="*/ 1157375 w 2567076"/>
-              <a:gd name="connsiteY1" fmla="*/ 952500 h 952500"/>
-              <a:gd name="connsiteX2" fmla="*/ 88 w 2567076"/>
-              <a:gd name="connsiteY2" fmla="*/ 242887 h 952500"/>
-              <a:gd name="connsiteX0" fmla="*/ 2567076 w 2567389"/>
-              <a:gd name="connsiteY0" fmla="*/ 0 h 952500"/>
-              <a:gd name="connsiteX1" fmla="*/ 1157375 w 2567389"/>
-              <a:gd name="connsiteY1" fmla="*/ 952500 h 952500"/>
-              <a:gd name="connsiteX2" fmla="*/ 88 w 2567389"/>
-              <a:gd name="connsiteY2" fmla="*/ 242887 h 952500"/>
-              <a:gd name="connsiteX0" fmla="*/ 2567076 w 2567390"/>
-              <a:gd name="connsiteY0" fmla="*/ 0 h 952558"/>
-              <a:gd name="connsiteX1" fmla="*/ 1157375 w 2567390"/>
-              <a:gd name="connsiteY1" fmla="*/ 952500 h 952558"/>
-              <a:gd name="connsiteX2" fmla="*/ 88 w 2567390"/>
-              <a:gd name="connsiteY2" fmla="*/ 242887 h 952558"/>
-              <a:gd name="connsiteX0" fmla="*/ 2567076 w 2567076"/>
-              <a:gd name="connsiteY0" fmla="*/ 0 h 976463"/>
-              <a:gd name="connsiteX1" fmla="*/ 1157375 w 2567076"/>
-              <a:gd name="connsiteY1" fmla="*/ 952500 h 976463"/>
-              <a:gd name="connsiteX2" fmla="*/ 88 w 2567076"/>
-              <a:gd name="connsiteY2" fmla="*/ 242887 h 976463"/>
-              <a:gd name="connsiteX0" fmla="*/ 2566988 w 2566988"/>
-              <a:gd name="connsiteY0" fmla="*/ 0 h 976463"/>
-              <a:gd name="connsiteX1" fmla="*/ 1157287 w 2566988"/>
-              <a:gd name="connsiteY1" fmla="*/ 952500 h 976463"/>
-              <a:gd name="connsiteX2" fmla="*/ 0 w 2566988"/>
-              <a:gd name="connsiteY2" fmla="*/ 242887 h 976463"/>
-              <a:gd name="connsiteX0" fmla="*/ 2566988 w 2566988"/>
-              <a:gd name="connsiteY0" fmla="*/ 0 h 999455"/>
-              <a:gd name="connsiteX1" fmla="*/ 1119187 w 2566988"/>
-              <a:gd name="connsiteY1" fmla="*/ 981075 h 999455"/>
-              <a:gd name="connsiteX2" fmla="*/ 0 w 2566988"/>
-              <a:gd name="connsiteY2" fmla="*/ 242887 h 999455"/>
-              <a:gd name="connsiteX0" fmla="*/ 2566988 w 2566988"/>
-              <a:gd name="connsiteY0" fmla="*/ 0 h 999303"/>
-              <a:gd name="connsiteX1" fmla="*/ 1119187 w 2566988"/>
-              <a:gd name="connsiteY1" fmla="*/ 981075 h 999303"/>
-              <a:gd name="connsiteX2" fmla="*/ 0 w 2566988"/>
-              <a:gd name="connsiteY2" fmla="*/ 242887 h 999303"/>
-              <a:gd name="connsiteX0" fmla="*/ 2566988 w 2566988"/>
-              <a:gd name="connsiteY0" fmla="*/ 0 h 999303"/>
-              <a:gd name="connsiteX1" fmla="*/ 1119187 w 2566988"/>
-              <a:gd name="connsiteY1" fmla="*/ 981075 h 999303"/>
-              <a:gd name="connsiteX2" fmla="*/ 0 w 2566988"/>
-              <a:gd name="connsiteY2" fmla="*/ 242887 h 999303"/>
-              <a:gd name="connsiteX0" fmla="*/ 2566988 w 2567163"/>
-              <a:gd name="connsiteY0" fmla="*/ 0 h 983879"/>
-              <a:gd name="connsiteX1" fmla="*/ 1119187 w 2567163"/>
-              <a:gd name="connsiteY1" fmla="*/ 981075 h 983879"/>
-              <a:gd name="connsiteX2" fmla="*/ 0 w 2567163"/>
-              <a:gd name="connsiteY2" fmla="*/ 242887 h 983879"/>
-              <a:gd name="connsiteX0" fmla="*/ 2566988 w 2567168"/>
-              <a:gd name="connsiteY0" fmla="*/ 0 h 1121055"/>
-              <a:gd name="connsiteX1" fmla="*/ 1119187 w 2567168"/>
-              <a:gd name="connsiteY1" fmla="*/ 1100138 h 1121055"/>
-              <a:gd name="connsiteX2" fmla="*/ 0 w 2567168"/>
-              <a:gd name="connsiteY2" fmla="*/ 361950 h 1121055"/>
-              <a:gd name="connsiteX0" fmla="*/ 2572092 w 2572271"/>
-              <a:gd name="connsiteY0" fmla="*/ 0 h 1138796"/>
-              <a:gd name="connsiteX1" fmla="*/ 1119187 w 2572271"/>
-              <a:gd name="connsiteY1" fmla="*/ 1116807 h 1138796"/>
-              <a:gd name="connsiteX2" fmla="*/ 0 w 2572271"/>
-              <a:gd name="connsiteY2" fmla="*/ 378619 h 1138796"/>
-              <a:gd name="connsiteX0" fmla="*/ 2572092 w 2572271"/>
-              <a:gd name="connsiteY0" fmla="*/ 0 h 1138796"/>
-              <a:gd name="connsiteX1" fmla="*/ 1119187 w 2572271"/>
-              <a:gd name="connsiteY1" fmla="*/ 1116807 h 1138796"/>
-              <a:gd name="connsiteX2" fmla="*/ 0 w 2572271"/>
-              <a:gd name="connsiteY2" fmla="*/ 378619 h 1138796"/>
-              <a:gd name="connsiteX0" fmla="*/ 2572092 w 2572271"/>
-              <a:gd name="connsiteY0" fmla="*/ 0 h 1138796"/>
-              <a:gd name="connsiteX1" fmla="*/ 1119187 w 2572271"/>
-              <a:gd name="connsiteY1" fmla="*/ 1116807 h 1138796"/>
-              <a:gd name="connsiteX2" fmla="*/ 0 w 2572271"/>
-              <a:gd name="connsiteY2" fmla="*/ 378619 h 1138796"/>
-              <a:gd name="connsiteX0" fmla="*/ 2572092 w 2572271"/>
-              <a:gd name="connsiteY0" fmla="*/ 0 h 1121535"/>
-              <a:gd name="connsiteX1" fmla="*/ 1119187 w 2572271"/>
-              <a:gd name="connsiteY1" fmla="*/ 1116807 h 1121535"/>
-              <a:gd name="connsiteX2" fmla="*/ 0 w 2572271"/>
-              <a:gd name="connsiteY2" fmla="*/ 378619 h 1121535"/>
-              <a:gd name="connsiteX0" fmla="*/ 2572092 w 2572271"/>
-              <a:gd name="connsiteY0" fmla="*/ 0 h 1155619"/>
-              <a:gd name="connsiteX1" fmla="*/ 1121739 w 2572271"/>
-              <a:gd name="connsiteY1" fmla="*/ 1152526 h 1155619"/>
-              <a:gd name="connsiteX2" fmla="*/ 0 w 2572271"/>
-              <a:gd name="connsiteY2" fmla="*/ 378619 h 1155619"/>
-              <a:gd name="connsiteX0" fmla="*/ 2572092 w 2572272"/>
-              <a:gd name="connsiteY0" fmla="*/ 0 h 1155330"/>
-              <a:gd name="connsiteX1" fmla="*/ 1121739 w 2572272"/>
-              <a:gd name="connsiteY1" fmla="*/ 1152526 h 1155330"/>
-              <a:gd name="connsiteX2" fmla="*/ 0 w 2572272"/>
-              <a:gd name="connsiteY2" fmla="*/ 378619 h 1155330"/>
-            </a:gdLst>
-            <a:ahLst/>
-            <a:cxnLst>
-              <a:cxn ang="0">
-                <a:pos x="connsiteX0" y="connsiteY0"/>
-              </a:cxn>
-              <a:cxn ang="0">
-                <a:pos x="connsiteX1" y="connsiteY1"/>
-              </a:cxn>
-              <a:cxn ang="0">
-                <a:pos x="connsiteX2" y="connsiteY2"/>
-              </a:cxn>
-            </a:cxnLst>
-            <a:rect l="l" t="t" r="r" b="b"/>
-            <a:pathLst>
-              <a:path w="2572272" h="1155330">
-                <a:moveTo>
-                  <a:pt x="2572092" y="0"/>
-                </a:moveTo>
-                <a:cubicBezTo>
-                  <a:pt x="2587967" y="1248568"/>
-                  <a:pt x="1552971" y="1156098"/>
-                  <a:pt x="1121739" y="1152526"/>
-                </a:cubicBezTo>
-                <a:cubicBezTo>
-                  <a:pt x="690507" y="1148954"/>
-                  <a:pt x="0" y="1154907"/>
-                  <a:pt x="0" y="378619"/>
-                </a:cubicBezTo>
-              </a:path>
-            </a:pathLst>
-          </a:custGeom>
-          <a:noFill/>
-          <a:ln w="57150">
+          </a:prstGeom>
+          <a:solidFill>
+            <a:schemeClr val="accent5">
+              <a:lumMod val="50000"/>
+            </a:schemeClr>
+          </a:solidFill>
+          <a:ln w="19050" cap="flat" cmpd="sng" algn="ctr">
             <a:solidFill>
-              <a:srgbClr val="92D050">
-                <a:alpha val="85098"/>
-              </a:srgbClr>
+              <a:schemeClr val="tx1"/>
+            </a:solidFill>
+            <a:prstDash val="solid"/>
+            <a:miter lim="800000"/>
+          </a:ln>
+          <a:effectLst/>
+        </p:spPr>
+        <p:txBody>
+          <a:bodyPr lIns="0" tIns="0" rIns="0" bIns="0" rtlCol="0" anchor="ctr"/>
+          <a:lstStyle/>
+          <a:p>
+            <a:pPr algn="ctr">
+              <a:buClrTx/>
+            </a:pPr>
+            <a:r>
+              <a:rPr lang="en-US" sz="1000" dirty="0">
+                <a:solidFill>
+                  <a:schemeClr val="bg1"/>
+                </a:solidFill>
+                <a:latin typeface="Calibri" panose="020F0502020204030204"/>
+              </a:rPr>
+              <a:t>Updater</a:t>
+            </a:r>
+          </a:p>
+        </p:txBody>
+      </p:sp>
+      <p:cxnSp>
+        <p:nvCxnSpPr>
+          <p:cNvPr id="5" name="Straight Arrow Connector 4">
+            <a:extLst>
+              <a:ext uri="{FF2B5EF4-FFF2-40B4-BE49-F238E27FC236}">
+                <a16:creationId xmlns:a16="http://schemas.microsoft.com/office/drawing/2014/main" id="{A2323D71-D7C5-48FA-BC8F-5B7D42ED3061}"/>
+              </a:ext>
+            </a:extLst>
+          </p:cNvPr>
+          <p:cNvCxnSpPr>
+            <a:cxnSpLocks/>
+            <a:stCxn id="41" idx="2"/>
+            <a:endCxn id="35" idx="0"/>
+          </p:cNvCxnSpPr>
+          <p:nvPr/>
+        </p:nvCxnSpPr>
+        <p:spPr>
+          <a:xfrm>
+            <a:off x="5159190" y="3734437"/>
+            <a:ext cx="3644" cy="194110"/>
+          </a:xfrm>
+          <a:prstGeom prst="straightConnector1">
+            <a:avLst/>
+          </a:prstGeom>
+          <a:ln w="19050">
+            <a:solidFill>
+              <a:srgbClr val="C00000"/>
             </a:solidFill>
             <a:headEnd type="none" w="med" len="med"/>
             <a:tailEnd type="triangle" w="med" len="med"/>
           </a:ln>
         </p:spPr>
         <p:style>
-          <a:lnRef idx="2">
-            <a:schemeClr val="accent1">
-              <a:shade val="50000"/>
-            </a:schemeClr>
+          <a:lnRef idx="1">
+            <a:schemeClr val="accent1"/>
           </a:lnRef>
-          <a:fillRef idx="1">
+          <a:fillRef idx="0">
             <a:schemeClr val="accent1"/>
           </a:fillRef>
           <a:effectRef idx="0">
             <a:schemeClr val="accent1"/>
           </a:effectRef>
           <a:fontRef idx="minor">
-            <a:schemeClr val="lt1"/>
+            <a:schemeClr val="tx1"/>
           </a:fontRef>
         </p:style>
-        <p:txBody>
-          <a:bodyPr rtlCol="0" anchor="ctr"/>
-          <a:lstStyle/>
-          <a:p>
-            <a:pPr algn="ctr"/>
-            <a:endParaRPr lang="en-US" dirty="0"/>
-          </a:p>
-        </p:txBody>
-      </p:sp>
+      </p:cxnSp>
       <p:cxnSp>
         <p:nvCxnSpPr>
-          <p:cNvPr id="6" name="Straight Arrow Connector 5">
+          <p:cNvPr id="8" name="Straight Arrow Connector 7">
             <a:extLst>
               <a:ext uri="{FF2B5EF4-FFF2-40B4-BE49-F238E27FC236}">
-                <a16:creationId xmlns:a16="http://schemas.microsoft.com/office/drawing/2014/main" id="{F1C9E167-6EF7-44F5-ABA5-05954EE38FFD}"/>
+                <a16:creationId xmlns:a16="http://schemas.microsoft.com/office/drawing/2014/main" id="{5CDCCD4F-98A4-41E6-8963-43CEF4C5ACC8}"/>
               </a:ext>
             </a:extLst>
           </p:cNvPr>
           <p:cNvCxnSpPr>
             <a:cxnSpLocks/>
+            <a:stCxn id="74" idx="2"/>
+            <a:endCxn id="2" idx="0"/>
           </p:cNvCxnSpPr>
           <p:nvPr/>
         </p:nvCxnSpPr>
         <p:spPr>
-          <a:xfrm flipH="1" flipV="1">
-            <a:off x="2396746" y="3671546"/>
-            <a:ext cx="1" cy="266527"/>
+          <a:xfrm flipH="1">
+            <a:off x="6496554" y="3736798"/>
+            <a:ext cx="1" cy="198010"/>
           </a:xfrm>
           <a:prstGeom prst="straightConnector1">
             <a:avLst/>
           </a:prstGeom>
-          <a:noFill/>
-          <a:ln w="57150">
+          <a:ln w="19050">
             <a:solidFill>
-              <a:srgbClr val="92D050">
-                <a:alpha val="85098"/>
-              </a:srgbClr>
+              <a:srgbClr val="C00000"/>
             </a:solidFill>
             <a:headEnd type="none" w="med" len="med"/>
             <a:tailEnd type="triangle" w="med" len="med"/>
           </a:ln>
         </p:spPr>
         <p:style>
-          <a:lnRef idx="2">
-            <a:schemeClr val="accent1">
-              <a:shade val="50000"/>
-            </a:schemeClr>
+          <a:lnRef idx="1">
+            <a:schemeClr val="accent1"/>
           </a:lnRef>
-          <a:fillRef idx="1">
+          <a:fillRef idx="0">
             <a:schemeClr val="accent1"/>
           </a:fillRef>
           <a:effectRef idx="0">
             <a:schemeClr val="accent1"/>
           </a:effectRef>
           <a:fontRef idx="minor">
-            <a:schemeClr val="lt1"/>
+            <a:schemeClr val="tx1"/>
           </a:fontRef>
         </p:style>
       </p:cxnSp>
+      <p:cxnSp>
+        <p:nvCxnSpPr>
+          <p:cNvPr id="10" name="Straight Arrow Connector 9">
+            <a:extLst>
+              <a:ext uri="{FF2B5EF4-FFF2-40B4-BE49-F238E27FC236}">
+                <a16:creationId xmlns:a16="http://schemas.microsoft.com/office/drawing/2014/main" id="{97BC9218-E73E-488D-B51F-BEC4176CA00D}"/>
+              </a:ext>
+            </a:extLst>
+          </p:cNvPr>
+          <p:cNvCxnSpPr>
+            <a:cxnSpLocks/>
+            <a:stCxn id="24" idx="2"/>
+            <a:endCxn id="25" idx="0"/>
+          </p:cNvCxnSpPr>
+          <p:nvPr/>
+        </p:nvCxnSpPr>
+        <p:spPr>
+          <a:xfrm>
+            <a:off x="7631656" y="3736595"/>
+            <a:ext cx="0" cy="191952"/>
+          </a:xfrm>
+          <a:prstGeom prst="straightConnector1">
+            <a:avLst/>
+          </a:prstGeom>
+          <a:ln w="19050">
+            <a:solidFill>
+              <a:srgbClr val="C00000"/>
+            </a:solidFill>
+            <a:headEnd type="none" w="med" len="med"/>
+            <a:tailEnd type="triangle" w="med" len="med"/>
+          </a:ln>
+        </p:spPr>
+        <p:style>
+          <a:lnRef idx="1">
+            <a:schemeClr val="accent1"/>
+          </a:lnRef>
+          <a:fillRef idx="0">
+            <a:schemeClr val="accent1"/>
+          </a:fillRef>
+          <a:effectRef idx="0">
+            <a:schemeClr val="accent1"/>
+          </a:effectRef>
+          <a:fontRef idx="minor">
+            <a:schemeClr val="tx1"/>
+          </a:fontRef>
+        </p:style>
+      </p:cxnSp>
+      <p:cxnSp>
+        <p:nvCxnSpPr>
+          <p:cNvPr id="21" name="Straight Arrow Connector 20">
+            <a:extLst>
+              <a:ext uri="{FF2B5EF4-FFF2-40B4-BE49-F238E27FC236}">
+                <a16:creationId xmlns:a16="http://schemas.microsoft.com/office/drawing/2014/main" id="{D139A461-CBBC-4CF4-8F7A-0CDD0656D842}"/>
+              </a:ext>
+            </a:extLst>
+          </p:cNvPr>
+          <p:cNvCxnSpPr>
+            <a:stCxn id="34" idx="0"/>
+            <a:endCxn id="77" idx="2"/>
+          </p:cNvCxnSpPr>
+          <p:nvPr/>
+        </p:nvCxnSpPr>
+        <p:spPr>
+          <a:xfrm flipV="1">
+            <a:off x="2355176" y="3736595"/>
+            <a:ext cx="1" cy="191952"/>
+          </a:xfrm>
+          <a:prstGeom prst="straightConnector1">
+            <a:avLst/>
+          </a:prstGeom>
+          <a:ln w="19050">
+            <a:solidFill>
+              <a:srgbClr val="C00000"/>
+            </a:solidFill>
+            <a:headEnd type="none" w="med" len="med"/>
+            <a:tailEnd type="triangle" w="med" len="med"/>
+          </a:ln>
+        </p:spPr>
+        <p:style>
+          <a:lnRef idx="1">
+            <a:schemeClr val="accent1"/>
+          </a:lnRef>
+          <a:fillRef idx="0">
+            <a:schemeClr val="accent1"/>
+          </a:fillRef>
+          <a:effectRef idx="0">
+            <a:schemeClr val="accent1"/>
+          </a:effectRef>
+          <a:fontRef idx="minor">
+            <a:schemeClr val="tx1"/>
+          </a:fontRef>
+        </p:style>
+      </p:cxnSp>
+      <p:cxnSp>
+        <p:nvCxnSpPr>
+          <p:cNvPr id="27" name="Straight Arrow Connector 26">
+            <a:extLst>
+              <a:ext uri="{FF2B5EF4-FFF2-40B4-BE49-F238E27FC236}">
+                <a16:creationId xmlns:a16="http://schemas.microsoft.com/office/drawing/2014/main" id="{59D05FBA-7644-4A1C-9DEB-2596772659AD}"/>
+              </a:ext>
+            </a:extLst>
+          </p:cNvPr>
+          <p:cNvCxnSpPr>
+            <a:stCxn id="87" idx="1"/>
+            <a:endCxn id="75" idx="3"/>
+          </p:cNvCxnSpPr>
+          <p:nvPr/>
+        </p:nvCxnSpPr>
+        <p:spPr>
+          <a:xfrm flipH="1">
+            <a:off x="3789942" y="4813366"/>
+            <a:ext cx="880499" cy="136"/>
+          </a:xfrm>
+          <a:prstGeom prst="straightConnector1">
+            <a:avLst/>
+          </a:prstGeom>
+          <a:ln w="19050">
+            <a:solidFill>
+              <a:srgbClr val="C00000"/>
+            </a:solidFill>
+            <a:headEnd type="none" w="med" len="med"/>
+            <a:tailEnd type="triangle" w="med" len="med"/>
+          </a:ln>
+        </p:spPr>
+        <p:style>
+          <a:lnRef idx="1">
+            <a:schemeClr val="accent1"/>
+          </a:lnRef>
+          <a:fillRef idx="0">
+            <a:schemeClr val="accent1"/>
+          </a:fillRef>
+          <a:effectRef idx="0">
+            <a:schemeClr val="accent1"/>
+          </a:effectRef>
+          <a:fontRef idx="minor">
+            <a:schemeClr val="tx1"/>
+          </a:fontRef>
+        </p:style>
+      </p:cxnSp>
+      <p:sp>
+        <p:nvSpPr>
+          <p:cNvPr id="26" name="TextBox 78">
+            <a:extLst>
+              <a:ext uri="{FF2B5EF4-FFF2-40B4-BE49-F238E27FC236}">
+                <a16:creationId xmlns:a16="http://schemas.microsoft.com/office/drawing/2014/main" id="{00E4C72D-ED90-412D-8B60-7A4D0DFB3ADD}"/>
+              </a:ext>
+            </a:extLst>
+          </p:cNvPr>
+          <p:cNvSpPr txBox="1"/>
+          <p:nvPr/>
+        </p:nvSpPr>
+        <p:spPr>
+          <a:xfrm>
+            <a:off x="3937151" y="4605617"/>
+            <a:ext cx="586080" cy="415498"/>
+          </a:xfrm>
+          <a:prstGeom prst="rect">
+            <a:avLst/>
+          </a:prstGeom>
+          <a:solidFill>
+            <a:schemeClr val="bg1"/>
+          </a:solidFill>
+          <a:ln>
+            <a:solidFill>
+              <a:schemeClr val="tx1"/>
+            </a:solidFill>
+          </a:ln>
+        </p:spPr>
+        <p:txBody>
+          <a:bodyPr wrap="square" rtlCol="0">
+            <a:spAutoFit/>
+          </a:bodyPr>
+          <a:lstStyle>
+            <a:defPPr>
+              <a:defRPr lang="en-US"/>
+            </a:defPPr>
+            <a:lvl1pPr marL="0" algn="l" defTabSz="914400" rtl="0" eaLnBrk="1" latinLnBrk="0" hangingPunct="1">
+              <a:defRPr sz="1800" kern="1200">
+                <a:solidFill>
+                  <a:schemeClr val="tx1"/>
+                </a:solidFill>
+                <a:latin typeface="+mn-lt"/>
+                <a:ea typeface="+mn-ea"/>
+                <a:cs typeface="+mn-cs"/>
+              </a:defRPr>
+            </a:lvl1pPr>
+            <a:lvl2pPr marL="457200" algn="l" defTabSz="914400" rtl="0" eaLnBrk="1" latinLnBrk="0" hangingPunct="1">
+              <a:defRPr sz="1800" kern="1200">
+                <a:solidFill>
+                  <a:schemeClr val="tx1"/>
+                </a:solidFill>
+                <a:latin typeface="+mn-lt"/>
+                <a:ea typeface="+mn-ea"/>
+                <a:cs typeface="+mn-cs"/>
+              </a:defRPr>
+            </a:lvl2pPr>
+            <a:lvl3pPr marL="914400" algn="l" defTabSz="914400" rtl="0" eaLnBrk="1" latinLnBrk="0" hangingPunct="1">
+              <a:defRPr sz="1800" kern="1200">
+                <a:solidFill>
+                  <a:schemeClr val="tx1"/>
+                </a:solidFill>
+                <a:latin typeface="+mn-lt"/>
+                <a:ea typeface="+mn-ea"/>
+                <a:cs typeface="+mn-cs"/>
+              </a:defRPr>
+            </a:lvl3pPr>
+            <a:lvl4pPr marL="1371600" algn="l" defTabSz="914400" rtl="0" eaLnBrk="1" latinLnBrk="0" hangingPunct="1">
+              <a:defRPr sz="1800" kern="1200">
+                <a:solidFill>
+                  <a:schemeClr val="tx1"/>
+                </a:solidFill>
+                <a:latin typeface="+mn-lt"/>
+                <a:ea typeface="+mn-ea"/>
+                <a:cs typeface="+mn-cs"/>
+              </a:defRPr>
+            </a:lvl4pPr>
+            <a:lvl5pPr marL="1828800" algn="l" defTabSz="914400" rtl="0" eaLnBrk="1" latinLnBrk="0" hangingPunct="1">
+              <a:defRPr sz="1800" kern="1200">
+                <a:solidFill>
+                  <a:schemeClr val="tx1"/>
+                </a:solidFill>
+                <a:latin typeface="+mn-lt"/>
+                <a:ea typeface="+mn-ea"/>
+                <a:cs typeface="+mn-cs"/>
+              </a:defRPr>
+            </a:lvl5pPr>
+            <a:lvl6pPr marL="2286000" algn="l" defTabSz="914400" rtl="0" eaLnBrk="1" latinLnBrk="0" hangingPunct="1">
+              <a:defRPr sz="1800" kern="1200">
+                <a:solidFill>
+                  <a:schemeClr val="tx1"/>
+                </a:solidFill>
+                <a:latin typeface="+mn-lt"/>
+                <a:ea typeface="+mn-ea"/>
+                <a:cs typeface="+mn-cs"/>
+              </a:defRPr>
+            </a:lvl6pPr>
+            <a:lvl7pPr marL="2743200" algn="l" defTabSz="914400" rtl="0" eaLnBrk="1" latinLnBrk="0" hangingPunct="1">
+              <a:defRPr sz="1800" kern="1200">
+                <a:solidFill>
+                  <a:schemeClr val="tx1"/>
+                </a:solidFill>
+                <a:latin typeface="+mn-lt"/>
+                <a:ea typeface="+mn-ea"/>
+                <a:cs typeface="+mn-cs"/>
+              </a:defRPr>
+            </a:lvl7pPr>
+            <a:lvl8pPr marL="3200400" algn="l" defTabSz="914400" rtl="0" eaLnBrk="1" latinLnBrk="0" hangingPunct="1">
+              <a:defRPr sz="1800" kern="1200">
+                <a:solidFill>
+                  <a:schemeClr val="tx1"/>
+                </a:solidFill>
+                <a:latin typeface="+mn-lt"/>
+                <a:ea typeface="+mn-ea"/>
+                <a:cs typeface="+mn-cs"/>
+              </a:defRPr>
+            </a:lvl8pPr>
+            <a:lvl9pPr marL="3657600" algn="l" defTabSz="914400" rtl="0" eaLnBrk="1" latinLnBrk="0" hangingPunct="1">
+              <a:defRPr sz="1800" kern="1200">
+                <a:solidFill>
+                  <a:schemeClr val="tx1"/>
+                </a:solidFill>
+                <a:latin typeface="+mn-lt"/>
+                <a:ea typeface="+mn-ea"/>
+                <a:cs typeface="+mn-cs"/>
+              </a:defRPr>
+            </a:lvl9pPr>
+          </a:lstStyle>
+          <a:p>
+            <a:pPr algn="ctr">
+              <a:buClrTx/>
+              <a:buFontTx/>
+              <a:buNone/>
+            </a:pPr>
+            <a:r>
+              <a:rPr lang="en-US" sz="700" i="1" dirty="0">
+                <a:solidFill>
+                  <a:srgbClr val="000000"/>
+                </a:solidFill>
+                <a:latin typeface="Calibri" panose="020F0502020204030204"/>
+              </a:rPr>
+              <a:t>micro-ROS</a:t>
+            </a:r>
+          </a:p>
+          <a:p>
+            <a:pPr algn="ctr">
+              <a:buClrTx/>
+              <a:buFontTx/>
+              <a:buNone/>
+            </a:pPr>
+            <a:r>
+              <a:rPr lang="en-US" sz="700" i="1" dirty="0">
+                <a:solidFill>
+                  <a:srgbClr val="000000"/>
+                </a:solidFill>
+                <a:latin typeface="Calibri" panose="020F0502020204030204"/>
+              </a:rPr>
+              <a:t>diagnostic</a:t>
+            </a:r>
+          </a:p>
+          <a:p>
+            <a:pPr algn="ctr">
+              <a:buClrTx/>
+              <a:buFontTx/>
+              <a:buNone/>
+            </a:pPr>
+            <a:r>
+              <a:rPr lang="en-US" sz="700" i="1" dirty="0" err="1">
+                <a:solidFill>
+                  <a:srgbClr val="000000"/>
+                </a:solidFill>
+                <a:latin typeface="Calibri" panose="020F0502020204030204"/>
+              </a:rPr>
+              <a:t>msgs</a:t>
+            </a:r>
+            <a:endParaRPr lang="en-US" sz="700" i="1" dirty="0">
+              <a:solidFill>
+                <a:srgbClr val="000000"/>
+              </a:solidFill>
+              <a:latin typeface="Calibri" panose="020F0502020204030204"/>
+            </a:endParaRPr>
+          </a:p>
+        </p:txBody>
+      </p:sp>
     </p:spTree>
   </p:cSld>
   <p:clrMapOvr>

</xml_diff>

<commit_message>
Updated diagnostics architecture description (#285)
* Improved uros diagnostic architecture diagram
* Mention necessary translation of diagnostic messages
* Update _docs/concepts/client_library/diagnostics/index.md

Signed-off-by: Arne Nordmann (CR/AEA2) <arne.nordmann@de.bosch.com>
Co-authored-by: Ralph Lange <ralph-lange@users.noreply.github.com>
</commit_message>
<xml_diff>
--- a/_docs/concepts/client_library/diagnostics/diagnostics_architecture.pptx
+++ b/_docs/concepts/client_library/diagnostics/diagnostics_architecture.pptx
@@ -258,7 +258,7 @@
       </p15:sldGuideLst>
     </p:ext>
     <p:ext uri="http://customooxmlschemas.google.com/">
-      <go:slidesCustomData xmlns="" xmlns:mc="http://schemas.openxmlformats.org/markup-compatibility/2006" xmlns:mv="urn:schemas-microsoft-com:mac:vml" xmlns:c="http://schemas.openxmlformats.org/drawingml/2006/chart" xmlns:dgm="http://schemas.openxmlformats.org/drawingml/2006/diagram" xmlns:o="urn:schemas-microsoft-com:office:office" xmlns:v="urn:schemas-microsoft-com:vml" xmlns:pvml="urn:schemas-microsoft-com:office:powerpoint" xmlns:com="http://schemas.openxmlformats.org/drawingml/2006/compatibility" xmlns:p14="http://schemas.microsoft.com/office/powerpoint/2010/main" xmlns:p15="http://schemas.microsoft.com/office/powerpoint/2012/main" xmlns:go="http://customooxmlschemas.google.com/" r:id="rId8" roundtripDataSignature="AMtx7mjNETZj+lx0k8yFdZdgchI5QEOMEw=="/>
+      <go:slidesCustomData xmlns:go="http://customooxmlschemas.google.com/" xmlns:p15="http://schemas.microsoft.com/office/powerpoint/2012/main" xmlns:p14="http://schemas.microsoft.com/office/powerpoint/2010/main" xmlns:com="http://schemas.openxmlformats.org/drawingml/2006/compatibility" xmlns:pvml="urn:schemas-microsoft-com:office:powerpoint" xmlns:v="urn:schemas-microsoft-com:vml" xmlns:o="urn:schemas-microsoft-com:office:office" xmlns:dgm="http://schemas.openxmlformats.org/drawingml/2006/diagram" xmlns:c="http://schemas.openxmlformats.org/drawingml/2006/chart" xmlns:mv="urn:schemas-microsoft-com:mac:vml" xmlns:mc="http://schemas.openxmlformats.org/markup-compatibility/2006" xmlns="" r:id="rId8" roundtripDataSignature="AMtx7mjNETZj+lx0k8yFdZdgchI5QEOMEw=="/>
     </p:ext>
   </p:extLst>
 </p:presentation>
@@ -14644,7 +14644,7 @@
         </p:nvSpPr>
         <p:spPr>
           <a:xfrm>
-            <a:off x="4669669" y="3246051"/>
+            <a:off x="4675346" y="3250594"/>
             <a:ext cx="967687" cy="483843"/>
           </a:xfrm>
           <a:prstGeom prst="rect">
@@ -14836,236 +14836,6 @@
       </p:sp>
       <p:sp>
         <p:nvSpPr>
-          <p:cNvPr id="61" name="Freeform 52">
-            <a:extLst>
-              <a:ext uri="{FF2B5EF4-FFF2-40B4-BE49-F238E27FC236}">
-                <a16:creationId xmlns:a16="http://schemas.microsoft.com/office/drawing/2014/main" id="{C3991965-0826-48A7-96F8-0BEDB50B15EA}"/>
-              </a:ext>
-            </a:extLst>
-          </p:cNvPr>
-          <p:cNvSpPr/>
-          <p:nvPr/>
-        </p:nvSpPr>
-        <p:spPr>
-          <a:xfrm>
-            <a:off x="3791590" y="4738855"/>
-            <a:ext cx="659778" cy="178524"/>
-          </a:xfrm>
-          <a:custGeom>
-            <a:avLst/>
-            <a:gdLst>
-              <a:gd name="connsiteX0" fmla="*/ 0 w 1089660"/>
-              <a:gd name="connsiteY0" fmla="*/ 101558 h 194715"/>
-              <a:gd name="connsiteX1" fmla="*/ 327660 w 1089660"/>
-              <a:gd name="connsiteY1" fmla="*/ 2498 h 194715"/>
-              <a:gd name="connsiteX2" fmla="*/ 693420 w 1089660"/>
-              <a:gd name="connsiteY2" fmla="*/ 192998 h 194715"/>
-              <a:gd name="connsiteX3" fmla="*/ 1089660 w 1089660"/>
-              <a:gd name="connsiteY3" fmla="*/ 101558 h 194715"/>
-              <a:gd name="connsiteX4" fmla="*/ 1089660 w 1089660"/>
-              <a:gd name="connsiteY4" fmla="*/ 101558 h 194715"/>
-              <a:gd name="connsiteX5" fmla="*/ 1089660 w 1089660"/>
-              <a:gd name="connsiteY5" fmla="*/ 101558 h 194715"/>
-              <a:gd name="connsiteX0" fmla="*/ 0 w 1089660"/>
-              <a:gd name="connsiteY0" fmla="*/ 70227 h 162487"/>
-              <a:gd name="connsiteX1" fmla="*/ 313195 w 1089660"/>
-              <a:gd name="connsiteY1" fmla="*/ 4504 h 162487"/>
-              <a:gd name="connsiteX2" fmla="*/ 693420 w 1089660"/>
-              <a:gd name="connsiteY2" fmla="*/ 161667 h 162487"/>
-              <a:gd name="connsiteX3" fmla="*/ 1089660 w 1089660"/>
-              <a:gd name="connsiteY3" fmla="*/ 70227 h 162487"/>
-              <a:gd name="connsiteX4" fmla="*/ 1089660 w 1089660"/>
-              <a:gd name="connsiteY4" fmla="*/ 70227 h 162487"/>
-              <a:gd name="connsiteX5" fmla="*/ 1089660 w 1089660"/>
-              <a:gd name="connsiteY5" fmla="*/ 70227 h 162487"/>
-              <a:gd name="connsiteX0" fmla="*/ 0 w 1089660"/>
-              <a:gd name="connsiteY0" fmla="*/ 70838 h 172678"/>
-              <a:gd name="connsiteX1" fmla="*/ 313195 w 1089660"/>
-              <a:gd name="connsiteY1" fmla="*/ 5115 h 172678"/>
-              <a:gd name="connsiteX2" fmla="*/ 715116 w 1089660"/>
-              <a:gd name="connsiteY2" fmla="*/ 171803 h 172678"/>
-              <a:gd name="connsiteX3" fmla="*/ 1089660 w 1089660"/>
-              <a:gd name="connsiteY3" fmla="*/ 70838 h 172678"/>
-              <a:gd name="connsiteX4" fmla="*/ 1089660 w 1089660"/>
-              <a:gd name="connsiteY4" fmla="*/ 70838 h 172678"/>
-              <a:gd name="connsiteX5" fmla="*/ 1089660 w 1089660"/>
-              <a:gd name="connsiteY5" fmla="*/ 70838 h 172678"/>
-            </a:gdLst>
-            <a:ahLst/>
-            <a:cxnLst>
-              <a:cxn ang="0">
-                <a:pos x="connsiteX0" y="connsiteY0"/>
-              </a:cxn>
-              <a:cxn ang="0">
-                <a:pos x="connsiteX1" y="connsiteY1"/>
-              </a:cxn>
-              <a:cxn ang="0">
-                <a:pos x="connsiteX2" y="connsiteY2"/>
-              </a:cxn>
-              <a:cxn ang="0">
-                <a:pos x="connsiteX3" y="connsiteY3"/>
-              </a:cxn>
-              <a:cxn ang="0">
-                <a:pos x="connsiteX4" y="connsiteY4"/>
-              </a:cxn>
-              <a:cxn ang="0">
-                <a:pos x="connsiteX5" y="connsiteY5"/>
-              </a:cxn>
-            </a:cxnLst>
-            <a:rect l="l" t="t" r="r" b="b"/>
-            <a:pathLst>
-              <a:path w="1089660" h="172678">
-                <a:moveTo>
-                  <a:pt x="0" y="70838"/>
-                </a:moveTo>
-                <a:cubicBezTo>
-                  <a:pt x="106045" y="13688"/>
-                  <a:pt x="194009" y="-11712"/>
-                  <a:pt x="313195" y="5115"/>
-                </a:cubicBezTo>
-                <a:cubicBezTo>
-                  <a:pt x="432381" y="21942"/>
-                  <a:pt x="585705" y="160849"/>
-                  <a:pt x="715116" y="171803"/>
-                </a:cubicBezTo>
-                <a:cubicBezTo>
-                  <a:pt x="844527" y="182757"/>
-                  <a:pt x="1027236" y="87666"/>
-                  <a:pt x="1089660" y="70838"/>
-                </a:cubicBezTo>
-                <a:lnTo>
-                  <a:pt x="1089660" y="70838"/>
-                </a:lnTo>
-                <a:lnTo>
-                  <a:pt x="1089660" y="70838"/>
-                </a:lnTo>
-              </a:path>
-            </a:pathLst>
-          </a:custGeom>
-          <a:noFill/>
-          <a:ln w="28575" cap="flat" cmpd="sng" algn="ctr">
-            <a:solidFill>
-              <a:srgbClr val="000000"/>
-            </a:solidFill>
-            <a:prstDash val="sysDash"/>
-          </a:ln>
-          <a:effectLst/>
-        </p:spPr>
-        <p:txBody>
-          <a:bodyPr rtlCol="0" anchor="ctr"/>
-          <a:lstStyle>
-            <a:defPPr>
-              <a:defRPr lang="en-US"/>
-            </a:defPPr>
-            <a:lvl1pPr marL="0" algn="l" defTabSz="914400" rtl="0" eaLnBrk="1" latinLnBrk="0" hangingPunct="1">
-              <a:defRPr sz="1800" kern="1200">
-                <a:solidFill>
-                  <a:schemeClr val="lt1"/>
-                </a:solidFill>
-                <a:latin typeface="+mn-lt"/>
-                <a:ea typeface="+mn-ea"/>
-                <a:cs typeface="+mn-cs"/>
-              </a:defRPr>
-            </a:lvl1pPr>
-            <a:lvl2pPr marL="457200" algn="l" defTabSz="914400" rtl="0" eaLnBrk="1" latinLnBrk="0" hangingPunct="1">
-              <a:defRPr sz="1800" kern="1200">
-                <a:solidFill>
-                  <a:schemeClr val="lt1"/>
-                </a:solidFill>
-                <a:latin typeface="+mn-lt"/>
-                <a:ea typeface="+mn-ea"/>
-                <a:cs typeface="+mn-cs"/>
-              </a:defRPr>
-            </a:lvl2pPr>
-            <a:lvl3pPr marL="914400" algn="l" defTabSz="914400" rtl="0" eaLnBrk="1" latinLnBrk="0" hangingPunct="1">
-              <a:defRPr sz="1800" kern="1200">
-                <a:solidFill>
-                  <a:schemeClr val="lt1"/>
-                </a:solidFill>
-                <a:latin typeface="+mn-lt"/>
-                <a:ea typeface="+mn-ea"/>
-                <a:cs typeface="+mn-cs"/>
-              </a:defRPr>
-            </a:lvl3pPr>
-            <a:lvl4pPr marL="1371600" algn="l" defTabSz="914400" rtl="0" eaLnBrk="1" latinLnBrk="0" hangingPunct="1">
-              <a:defRPr sz="1800" kern="1200">
-                <a:solidFill>
-                  <a:schemeClr val="lt1"/>
-                </a:solidFill>
-                <a:latin typeface="+mn-lt"/>
-                <a:ea typeface="+mn-ea"/>
-                <a:cs typeface="+mn-cs"/>
-              </a:defRPr>
-            </a:lvl4pPr>
-            <a:lvl5pPr marL="1828800" algn="l" defTabSz="914400" rtl="0" eaLnBrk="1" latinLnBrk="0" hangingPunct="1">
-              <a:defRPr sz="1800" kern="1200">
-                <a:solidFill>
-                  <a:schemeClr val="lt1"/>
-                </a:solidFill>
-                <a:latin typeface="+mn-lt"/>
-                <a:ea typeface="+mn-ea"/>
-                <a:cs typeface="+mn-cs"/>
-              </a:defRPr>
-            </a:lvl5pPr>
-            <a:lvl6pPr marL="2286000" algn="l" defTabSz="914400" rtl="0" eaLnBrk="1" latinLnBrk="0" hangingPunct="1">
-              <a:defRPr sz="1800" kern="1200">
-                <a:solidFill>
-                  <a:schemeClr val="lt1"/>
-                </a:solidFill>
-                <a:latin typeface="+mn-lt"/>
-                <a:ea typeface="+mn-ea"/>
-                <a:cs typeface="+mn-cs"/>
-              </a:defRPr>
-            </a:lvl6pPr>
-            <a:lvl7pPr marL="2743200" algn="l" defTabSz="914400" rtl="0" eaLnBrk="1" latinLnBrk="0" hangingPunct="1">
-              <a:defRPr sz="1800" kern="1200">
-                <a:solidFill>
-                  <a:schemeClr val="lt1"/>
-                </a:solidFill>
-                <a:latin typeface="+mn-lt"/>
-                <a:ea typeface="+mn-ea"/>
-                <a:cs typeface="+mn-cs"/>
-              </a:defRPr>
-            </a:lvl7pPr>
-            <a:lvl8pPr marL="3200400" algn="l" defTabSz="914400" rtl="0" eaLnBrk="1" latinLnBrk="0" hangingPunct="1">
-              <a:defRPr sz="1800" kern="1200">
-                <a:solidFill>
-                  <a:schemeClr val="lt1"/>
-                </a:solidFill>
-                <a:latin typeface="+mn-lt"/>
-                <a:ea typeface="+mn-ea"/>
-                <a:cs typeface="+mn-cs"/>
-              </a:defRPr>
-            </a:lvl8pPr>
-            <a:lvl9pPr marL="3657600" algn="l" defTabSz="914400" rtl="0" eaLnBrk="1" latinLnBrk="0" hangingPunct="1">
-              <a:defRPr sz="1800" kern="1200">
-                <a:solidFill>
-                  <a:schemeClr val="lt1"/>
-                </a:solidFill>
-                <a:latin typeface="+mn-lt"/>
-                <a:ea typeface="+mn-ea"/>
-                <a:cs typeface="+mn-cs"/>
-              </a:defRPr>
-            </a:lvl9pPr>
-          </a:lstStyle>
-          <a:p>
-            <a:pPr algn="ctr" defTabSz="822564">
-              <a:buClrTx/>
-              <a:buFontTx/>
-              <a:buNone/>
-              <a:defRPr/>
-            </a:pPr>
-            <a:endParaRPr lang="en-US" sz="2159">
-              <a:solidFill>
-                <a:srgbClr val="FFFFFF"/>
-              </a:solidFill>
-              <a:latin typeface="Calibri" panose="020F0502020204030204"/>
-            </a:endParaRPr>
-          </a:p>
-        </p:txBody>
-      </p:sp>
-      <p:sp>
-        <p:nvSpPr>
           <p:cNvPr id="71" name="Rectangle 70">
             <a:extLst>
               <a:ext uri="{FF2B5EF4-FFF2-40B4-BE49-F238E27FC236}">
@@ -15078,7 +14848,7 @@
         </p:nvSpPr>
         <p:spPr>
           <a:xfrm>
-            <a:off x="4455199" y="5051797"/>
+            <a:off x="4677449" y="5051797"/>
             <a:ext cx="3275247" cy="74437"/>
           </a:xfrm>
           <a:prstGeom prst="rect">
@@ -15219,7 +14989,7 @@
         </p:nvSpPr>
         <p:spPr>
           <a:xfrm>
-            <a:off x="4455199" y="4089222"/>
+            <a:off x="4677449" y="4089222"/>
             <a:ext cx="3275247" cy="74437"/>
           </a:xfrm>
           <a:prstGeom prst="rect">
@@ -15360,7 +15130,7 @@
         </p:nvSpPr>
         <p:spPr>
           <a:xfrm>
-            <a:off x="6468923" y="3246050"/>
+            <a:off x="6012711" y="3252955"/>
             <a:ext cx="967687" cy="483843"/>
           </a:xfrm>
           <a:prstGeom prst="rect">
@@ -15737,179 +15507,6 @@
       </p:sp>
       <p:sp>
         <p:nvSpPr>
-          <p:cNvPr id="76" name="TextBox 78">
-            <a:extLst>
-              <a:ext uri="{FF2B5EF4-FFF2-40B4-BE49-F238E27FC236}">
-                <a16:creationId xmlns:a16="http://schemas.microsoft.com/office/drawing/2014/main" id="{7397B02E-5C68-4DF9-B83C-84914DABD04D}"/>
-              </a:ext>
-            </a:extLst>
-          </p:cNvPr>
-          <p:cNvSpPr txBox="1"/>
-          <p:nvPr/>
-        </p:nvSpPr>
-        <p:spPr>
-          <a:xfrm>
-            <a:off x="3793414" y="4880763"/>
-            <a:ext cx="681597" cy="507831"/>
-          </a:xfrm>
-          <a:prstGeom prst="rect">
-            <a:avLst/>
-          </a:prstGeom>
-          <a:noFill/>
-        </p:spPr>
-        <p:txBody>
-          <a:bodyPr wrap="none" rtlCol="0">
-            <a:spAutoFit/>
-          </a:bodyPr>
-          <a:lstStyle>
-            <a:defPPr>
-              <a:defRPr lang="en-US"/>
-            </a:defPPr>
-            <a:lvl1pPr marL="0" algn="l" defTabSz="914400" rtl="0" eaLnBrk="1" latinLnBrk="0" hangingPunct="1">
-              <a:defRPr sz="1800" kern="1200">
-                <a:solidFill>
-                  <a:schemeClr val="tx1"/>
-                </a:solidFill>
-                <a:latin typeface="+mn-lt"/>
-                <a:ea typeface="+mn-ea"/>
-                <a:cs typeface="+mn-cs"/>
-              </a:defRPr>
-            </a:lvl1pPr>
-            <a:lvl2pPr marL="457200" algn="l" defTabSz="914400" rtl="0" eaLnBrk="1" latinLnBrk="0" hangingPunct="1">
-              <a:defRPr sz="1800" kern="1200">
-                <a:solidFill>
-                  <a:schemeClr val="tx1"/>
-                </a:solidFill>
-                <a:latin typeface="+mn-lt"/>
-                <a:ea typeface="+mn-ea"/>
-                <a:cs typeface="+mn-cs"/>
-              </a:defRPr>
-            </a:lvl2pPr>
-            <a:lvl3pPr marL="914400" algn="l" defTabSz="914400" rtl="0" eaLnBrk="1" latinLnBrk="0" hangingPunct="1">
-              <a:defRPr sz="1800" kern="1200">
-                <a:solidFill>
-                  <a:schemeClr val="tx1"/>
-                </a:solidFill>
-                <a:latin typeface="+mn-lt"/>
-                <a:ea typeface="+mn-ea"/>
-                <a:cs typeface="+mn-cs"/>
-              </a:defRPr>
-            </a:lvl3pPr>
-            <a:lvl4pPr marL="1371600" algn="l" defTabSz="914400" rtl="0" eaLnBrk="1" latinLnBrk="0" hangingPunct="1">
-              <a:defRPr sz="1800" kern="1200">
-                <a:solidFill>
-                  <a:schemeClr val="tx1"/>
-                </a:solidFill>
-                <a:latin typeface="+mn-lt"/>
-                <a:ea typeface="+mn-ea"/>
-                <a:cs typeface="+mn-cs"/>
-              </a:defRPr>
-            </a:lvl4pPr>
-            <a:lvl5pPr marL="1828800" algn="l" defTabSz="914400" rtl="0" eaLnBrk="1" latinLnBrk="0" hangingPunct="1">
-              <a:defRPr sz="1800" kern="1200">
-                <a:solidFill>
-                  <a:schemeClr val="tx1"/>
-                </a:solidFill>
-                <a:latin typeface="+mn-lt"/>
-                <a:ea typeface="+mn-ea"/>
-                <a:cs typeface="+mn-cs"/>
-              </a:defRPr>
-            </a:lvl5pPr>
-            <a:lvl6pPr marL="2286000" algn="l" defTabSz="914400" rtl="0" eaLnBrk="1" latinLnBrk="0" hangingPunct="1">
-              <a:defRPr sz="1800" kern="1200">
-                <a:solidFill>
-                  <a:schemeClr val="tx1"/>
-                </a:solidFill>
-                <a:latin typeface="+mn-lt"/>
-                <a:ea typeface="+mn-ea"/>
-                <a:cs typeface="+mn-cs"/>
-              </a:defRPr>
-            </a:lvl6pPr>
-            <a:lvl7pPr marL="2743200" algn="l" defTabSz="914400" rtl="0" eaLnBrk="1" latinLnBrk="0" hangingPunct="1">
-              <a:defRPr sz="1800" kern="1200">
-                <a:solidFill>
-                  <a:schemeClr val="tx1"/>
-                </a:solidFill>
-                <a:latin typeface="+mn-lt"/>
-                <a:ea typeface="+mn-ea"/>
-                <a:cs typeface="+mn-cs"/>
-              </a:defRPr>
-            </a:lvl7pPr>
-            <a:lvl8pPr marL="3200400" algn="l" defTabSz="914400" rtl="0" eaLnBrk="1" latinLnBrk="0" hangingPunct="1">
-              <a:defRPr sz="1800" kern="1200">
-                <a:solidFill>
-                  <a:schemeClr val="tx1"/>
-                </a:solidFill>
-                <a:latin typeface="+mn-lt"/>
-                <a:ea typeface="+mn-ea"/>
-                <a:cs typeface="+mn-cs"/>
-              </a:defRPr>
-            </a:lvl8pPr>
-            <a:lvl9pPr marL="3657600" algn="l" defTabSz="914400" rtl="0" eaLnBrk="1" latinLnBrk="0" hangingPunct="1">
-              <a:defRPr sz="1800" kern="1200">
-                <a:solidFill>
-                  <a:schemeClr val="tx1"/>
-                </a:solidFill>
-                <a:latin typeface="+mn-lt"/>
-                <a:ea typeface="+mn-ea"/>
-                <a:cs typeface="+mn-cs"/>
-              </a:defRPr>
-            </a:lvl9pPr>
-          </a:lstStyle>
-          <a:p>
-            <a:pPr>
-              <a:buClrTx/>
-              <a:buFontTx/>
-              <a:buNone/>
-            </a:pPr>
-            <a:r>
-              <a:rPr lang="en-US" sz="900" dirty="0">
-                <a:solidFill>
-                  <a:srgbClr val="000000"/>
-                </a:solidFill>
-                <a:latin typeface="Calibri" panose="020F0502020204030204"/>
-              </a:rPr>
-              <a:t>Ethernet,</a:t>
-            </a:r>
-            <a:br>
-              <a:rPr lang="en-US" sz="900" dirty="0">
-                <a:solidFill>
-                  <a:srgbClr val="000000"/>
-                </a:solidFill>
-                <a:latin typeface="Calibri" panose="020F0502020204030204"/>
-              </a:rPr>
-            </a:br>
-            <a:r>
-              <a:rPr lang="en-US" sz="900" dirty="0">
-                <a:solidFill>
-                  <a:srgbClr val="000000"/>
-                </a:solidFill>
-                <a:latin typeface="Calibri" panose="020F0502020204030204"/>
-              </a:rPr>
-              <a:t>Bluetooth,</a:t>
-            </a:r>
-            <a:br>
-              <a:rPr lang="en-US" sz="900" dirty="0">
-                <a:solidFill>
-                  <a:srgbClr val="000000"/>
-                </a:solidFill>
-                <a:latin typeface="Calibri" panose="020F0502020204030204"/>
-              </a:rPr>
-            </a:br>
-            <a:r>
-              <a:rPr lang="en-US" sz="900" dirty="0">
-                <a:solidFill>
-                  <a:srgbClr val="000000"/>
-                </a:solidFill>
-                <a:latin typeface="Calibri" panose="020F0502020204030204"/>
-              </a:rPr>
-              <a:t>Serial</a:t>
-            </a:r>
-          </a:p>
-        </p:txBody>
-      </p:sp>
-      <p:sp>
-        <p:nvSpPr>
           <p:cNvPr id="77" name="Rectangle 76">
             <a:extLst>
               <a:ext uri="{FF2B5EF4-FFF2-40B4-BE49-F238E27FC236}">
@@ -15922,7 +15519,7 @@
         </p:nvSpPr>
         <p:spPr>
           <a:xfrm>
-            <a:off x="2069343" y="3246051"/>
+            <a:off x="1871333" y="3252752"/>
             <a:ext cx="967687" cy="483843"/>
           </a:xfrm>
           <a:prstGeom prst="rect">
@@ -16126,7 +15723,7 @@
         </p:nvSpPr>
         <p:spPr>
           <a:xfrm>
-            <a:off x="5637355" y="3161697"/>
+            <a:off x="5411055" y="3187423"/>
             <a:ext cx="831567" cy="523220"/>
           </a:xfrm>
           <a:prstGeom prst="rect">
@@ -16271,8 +15868,8 @@
         </p:nvSpPr>
         <p:spPr>
           <a:xfrm>
-            <a:off x="4455199" y="5158463"/>
-            <a:ext cx="3275247" cy="270000"/>
+            <a:off x="4677449" y="5158463"/>
+            <a:ext cx="3447486" cy="270000"/>
           </a:xfrm>
           <a:prstGeom prst="rect">
             <a:avLst/>
@@ -16442,8 +16039,8 @@
         </p:nvSpPr>
         <p:spPr>
           <a:xfrm>
-            <a:off x="4448191" y="4543366"/>
-            <a:ext cx="3282256" cy="540000"/>
+            <a:off x="4670441" y="4543366"/>
+            <a:ext cx="3447486" cy="540000"/>
           </a:xfrm>
           <a:prstGeom prst="rect">
             <a:avLst/>
@@ -16900,8 +16497,8 @@
         </p:nvSpPr>
         <p:spPr>
           <a:xfrm>
-            <a:off x="4448191" y="3928547"/>
-            <a:ext cx="3282256" cy="551648"/>
+            <a:off x="4670440" y="3928547"/>
+            <a:ext cx="3447487" cy="551648"/>
           </a:xfrm>
           <a:prstGeom prst="rect">
             <a:avLst/>
@@ -17193,7 +16790,7 @@
         </p:nvSpPr>
         <p:spPr>
           <a:xfrm>
-            <a:off x="6468922" y="3928547"/>
+            <a:off x="6223126" y="3934808"/>
             <a:ext cx="546856" cy="148153"/>
           </a:xfrm>
           <a:prstGeom prst="rect">
@@ -17246,7 +16843,7 @@
         </p:nvSpPr>
         <p:spPr>
           <a:xfrm>
-            <a:off x="2069343" y="3928547"/>
+            <a:off x="2027772" y="3928547"/>
             <a:ext cx="654807" cy="148153"/>
           </a:xfrm>
           <a:prstGeom prst="rect">
@@ -17297,7 +16894,7 @@
         </p:nvSpPr>
         <p:spPr>
           <a:xfrm>
-            <a:off x="4669669" y="3928547"/>
+            <a:off x="4889406" y="3928547"/>
             <a:ext cx="546856" cy="148153"/>
           </a:xfrm>
           <a:prstGeom prst="rect">
@@ -17338,10 +16935,10 @@
       </p:sp>
       <p:sp>
         <p:nvSpPr>
-          <p:cNvPr id="4" name="Freeform: Shape 3">
+          <p:cNvPr id="24" name="Rectangle 23">
             <a:extLst>
               <a:ext uri="{FF2B5EF4-FFF2-40B4-BE49-F238E27FC236}">
-                <a16:creationId xmlns:a16="http://schemas.microsoft.com/office/drawing/2014/main" id="{917FE7D4-2C7D-445C-B52E-8F85C71647DD}"/>
+                <a16:creationId xmlns:a16="http://schemas.microsoft.com/office/drawing/2014/main" id="{A415CA9D-2F76-4D70-9C80-6918C9FE560B}"/>
               </a:ext>
             </a:extLst>
           </p:cNvPr>
@@ -17350,220 +16947,177 @@
         </p:nvSpPr>
         <p:spPr>
           <a:xfrm>
-            <a:off x="2374339" y="3719514"/>
-            <a:ext cx="4378649" cy="1221594"/>
+            <a:off x="7145385" y="3246051"/>
+            <a:ext cx="972542" cy="490544"/>
           </a:xfrm>
-          <a:custGeom>
+          <a:prstGeom prst="rect">
             <a:avLst/>
-            <a:gdLst>
-              <a:gd name="connsiteX0" fmla="*/ 2653990 w 2882672"/>
-              <a:gd name="connsiteY0" fmla="*/ 0 h 896469"/>
-              <a:gd name="connsiteX1" fmla="*/ 2658752 w 2882672"/>
-              <a:gd name="connsiteY1" fmla="*/ 671512 h 896469"/>
-              <a:gd name="connsiteX2" fmla="*/ 315602 w 2882672"/>
-              <a:gd name="connsiteY2" fmla="*/ 876300 h 896469"/>
-              <a:gd name="connsiteX3" fmla="*/ 87002 w 2882672"/>
-              <a:gd name="connsiteY3" fmla="*/ 242887 h 896469"/>
-              <a:gd name="connsiteX0" fmla="*/ 2617314 w 2845996"/>
-              <a:gd name="connsiteY0" fmla="*/ 0 h 896469"/>
-              <a:gd name="connsiteX1" fmla="*/ 2622076 w 2845996"/>
-              <a:gd name="connsiteY1" fmla="*/ 671512 h 896469"/>
-              <a:gd name="connsiteX2" fmla="*/ 278926 w 2845996"/>
-              <a:gd name="connsiteY2" fmla="*/ 876300 h 896469"/>
-              <a:gd name="connsiteX3" fmla="*/ 50326 w 2845996"/>
-              <a:gd name="connsiteY3" fmla="*/ 242887 h 896469"/>
-              <a:gd name="connsiteX0" fmla="*/ 2567080 w 2732015"/>
-              <a:gd name="connsiteY0" fmla="*/ 0 h 967770"/>
-              <a:gd name="connsiteX1" fmla="*/ 2571842 w 2732015"/>
-              <a:gd name="connsiteY1" fmla="*/ 671512 h 967770"/>
-              <a:gd name="connsiteX2" fmla="*/ 1157379 w 2732015"/>
-              <a:gd name="connsiteY2" fmla="*/ 952500 h 967770"/>
-              <a:gd name="connsiteX3" fmla="*/ 92 w 2732015"/>
-              <a:gd name="connsiteY3" fmla="*/ 242887 h 967770"/>
-              <a:gd name="connsiteX0" fmla="*/ 2567076 w 2732011"/>
-              <a:gd name="connsiteY0" fmla="*/ 0 h 952629"/>
-              <a:gd name="connsiteX1" fmla="*/ 2571838 w 2732011"/>
-              <a:gd name="connsiteY1" fmla="*/ 671512 h 952629"/>
-              <a:gd name="connsiteX2" fmla="*/ 1157375 w 2732011"/>
-              <a:gd name="connsiteY2" fmla="*/ 952500 h 952629"/>
-              <a:gd name="connsiteX3" fmla="*/ 88 w 2732011"/>
-              <a:gd name="connsiteY3" fmla="*/ 242887 h 952629"/>
-              <a:gd name="connsiteX0" fmla="*/ 2567076 w 2567076"/>
-              <a:gd name="connsiteY0" fmla="*/ 0 h 952500"/>
-              <a:gd name="connsiteX1" fmla="*/ 1157375 w 2567076"/>
-              <a:gd name="connsiteY1" fmla="*/ 952500 h 952500"/>
-              <a:gd name="connsiteX2" fmla="*/ 88 w 2567076"/>
-              <a:gd name="connsiteY2" fmla="*/ 242887 h 952500"/>
-              <a:gd name="connsiteX0" fmla="*/ 2567076 w 2567389"/>
-              <a:gd name="connsiteY0" fmla="*/ 0 h 952500"/>
-              <a:gd name="connsiteX1" fmla="*/ 1157375 w 2567389"/>
-              <a:gd name="connsiteY1" fmla="*/ 952500 h 952500"/>
-              <a:gd name="connsiteX2" fmla="*/ 88 w 2567389"/>
-              <a:gd name="connsiteY2" fmla="*/ 242887 h 952500"/>
-              <a:gd name="connsiteX0" fmla="*/ 2567076 w 2567390"/>
-              <a:gd name="connsiteY0" fmla="*/ 0 h 952558"/>
-              <a:gd name="connsiteX1" fmla="*/ 1157375 w 2567390"/>
-              <a:gd name="connsiteY1" fmla="*/ 952500 h 952558"/>
-              <a:gd name="connsiteX2" fmla="*/ 88 w 2567390"/>
-              <a:gd name="connsiteY2" fmla="*/ 242887 h 952558"/>
-              <a:gd name="connsiteX0" fmla="*/ 2567076 w 2567076"/>
-              <a:gd name="connsiteY0" fmla="*/ 0 h 976463"/>
-              <a:gd name="connsiteX1" fmla="*/ 1157375 w 2567076"/>
-              <a:gd name="connsiteY1" fmla="*/ 952500 h 976463"/>
-              <a:gd name="connsiteX2" fmla="*/ 88 w 2567076"/>
-              <a:gd name="connsiteY2" fmla="*/ 242887 h 976463"/>
-              <a:gd name="connsiteX0" fmla="*/ 2566988 w 2566988"/>
-              <a:gd name="connsiteY0" fmla="*/ 0 h 976463"/>
-              <a:gd name="connsiteX1" fmla="*/ 1157287 w 2566988"/>
-              <a:gd name="connsiteY1" fmla="*/ 952500 h 976463"/>
-              <a:gd name="connsiteX2" fmla="*/ 0 w 2566988"/>
-              <a:gd name="connsiteY2" fmla="*/ 242887 h 976463"/>
-              <a:gd name="connsiteX0" fmla="*/ 2566988 w 2566988"/>
-              <a:gd name="connsiteY0" fmla="*/ 0 h 999455"/>
-              <a:gd name="connsiteX1" fmla="*/ 1119187 w 2566988"/>
-              <a:gd name="connsiteY1" fmla="*/ 981075 h 999455"/>
-              <a:gd name="connsiteX2" fmla="*/ 0 w 2566988"/>
-              <a:gd name="connsiteY2" fmla="*/ 242887 h 999455"/>
-              <a:gd name="connsiteX0" fmla="*/ 2566988 w 2566988"/>
-              <a:gd name="connsiteY0" fmla="*/ 0 h 999303"/>
-              <a:gd name="connsiteX1" fmla="*/ 1119187 w 2566988"/>
-              <a:gd name="connsiteY1" fmla="*/ 981075 h 999303"/>
-              <a:gd name="connsiteX2" fmla="*/ 0 w 2566988"/>
-              <a:gd name="connsiteY2" fmla="*/ 242887 h 999303"/>
-              <a:gd name="connsiteX0" fmla="*/ 2566988 w 2566988"/>
-              <a:gd name="connsiteY0" fmla="*/ 0 h 999303"/>
-              <a:gd name="connsiteX1" fmla="*/ 1119187 w 2566988"/>
-              <a:gd name="connsiteY1" fmla="*/ 981075 h 999303"/>
-              <a:gd name="connsiteX2" fmla="*/ 0 w 2566988"/>
-              <a:gd name="connsiteY2" fmla="*/ 242887 h 999303"/>
-              <a:gd name="connsiteX0" fmla="*/ 2566988 w 2567163"/>
-              <a:gd name="connsiteY0" fmla="*/ 0 h 983879"/>
-              <a:gd name="connsiteX1" fmla="*/ 1119187 w 2567163"/>
-              <a:gd name="connsiteY1" fmla="*/ 981075 h 983879"/>
-              <a:gd name="connsiteX2" fmla="*/ 0 w 2567163"/>
-              <a:gd name="connsiteY2" fmla="*/ 242887 h 983879"/>
-              <a:gd name="connsiteX0" fmla="*/ 2567269 w 2567444"/>
-              <a:gd name="connsiteY0" fmla="*/ 0 h 984811"/>
-              <a:gd name="connsiteX1" fmla="*/ 1119468 w 2567444"/>
-              <a:gd name="connsiteY1" fmla="*/ 981075 h 984811"/>
-              <a:gd name="connsiteX2" fmla="*/ 281 w 2567444"/>
-              <a:gd name="connsiteY2" fmla="*/ 242887 h 984811"/>
-              <a:gd name="connsiteX0" fmla="*/ 2568071 w 2568246"/>
-              <a:gd name="connsiteY0" fmla="*/ 0 h 995969"/>
-              <a:gd name="connsiteX1" fmla="*/ 1120270 w 2568246"/>
-              <a:gd name="connsiteY1" fmla="*/ 981075 h 995969"/>
-              <a:gd name="connsiteX2" fmla="*/ 1083 w 2568246"/>
-              <a:gd name="connsiteY2" fmla="*/ 242887 h 995969"/>
-              <a:gd name="connsiteX0" fmla="*/ 2568196 w 2568359"/>
-              <a:gd name="connsiteY0" fmla="*/ 0 h 1077758"/>
-              <a:gd name="connsiteX1" fmla="*/ 1039385 w 2568359"/>
-              <a:gd name="connsiteY1" fmla="*/ 1076325 h 1077758"/>
-              <a:gd name="connsiteX2" fmla="*/ 1208 w 2568359"/>
-              <a:gd name="connsiteY2" fmla="*/ 242887 h 1077758"/>
-              <a:gd name="connsiteX0" fmla="*/ 2568246 w 2568413"/>
-              <a:gd name="connsiteY0" fmla="*/ 0 h 1217060"/>
-              <a:gd name="connsiteX1" fmla="*/ 1039435 w 2568413"/>
-              <a:gd name="connsiteY1" fmla="*/ 1190625 h 1217060"/>
-              <a:gd name="connsiteX2" fmla="*/ 1258 w 2568413"/>
-              <a:gd name="connsiteY2" fmla="*/ 357187 h 1217060"/>
-              <a:gd name="connsiteX0" fmla="*/ 2568246 w 2568283"/>
-              <a:gd name="connsiteY0" fmla="*/ 0 h 1217060"/>
-              <a:gd name="connsiteX1" fmla="*/ 1039435 w 2568283"/>
-              <a:gd name="connsiteY1" fmla="*/ 1190625 h 1217060"/>
-              <a:gd name="connsiteX2" fmla="*/ 1258 w 2568283"/>
-              <a:gd name="connsiteY2" fmla="*/ 357187 h 1217060"/>
-              <a:gd name="connsiteX0" fmla="*/ 2568253 w 2568290"/>
-              <a:gd name="connsiteY0" fmla="*/ 0 h 1194620"/>
-              <a:gd name="connsiteX1" fmla="*/ 1039442 w 2568290"/>
-              <a:gd name="connsiteY1" fmla="*/ 1190625 h 1194620"/>
-              <a:gd name="connsiteX2" fmla="*/ 1265 w 2568290"/>
-              <a:gd name="connsiteY2" fmla="*/ 357187 h 1194620"/>
-              <a:gd name="connsiteX0" fmla="*/ 2568239 w 2568276"/>
-              <a:gd name="connsiteY0" fmla="*/ 0 h 1199980"/>
-              <a:gd name="connsiteX1" fmla="*/ 1039428 w 2568276"/>
-              <a:gd name="connsiteY1" fmla="*/ 1190625 h 1199980"/>
-              <a:gd name="connsiteX2" fmla="*/ 1251 w 2568276"/>
-              <a:gd name="connsiteY2" fmla="*/ 357187 h 1199980"/>
-              <a:gd name="connsiteX0" fmla="*/ 2568248 w 2568285"/>
-              <a:gd name="connsiteY0" fmla="*/ 0 h 1221594"/>
-              <a:gd name="connsiteX1" fmla="*/ 1033850 w 2568285"/>
-              <a:gd name="connsiteY1" fmla="*/ 1214437 h 1221594"/>
-              <a:gd name="connsiteX2" fmla="*/ 1260 w 2568285"/>
-              <a:gd name="connsiteY2" fmla="*/ 357187 h 1221594"/>
-            </a:gdLst>
-            <a:ahLst/>
-            <a:cxnLst>
-              <a:cxn ang="0">
-                <a:pos x="connsiteX0" y="connsiteY0"/>
-              </a:cxn>
-              <a:cxn ang="0">
-                <a:pos x="connsiteX1" y="connsiteY1"/>
-              </a:cxn>
-              <a:cxn ang="0">
-                <a:pos x="connsiteX2" y="connsiteY2"/>
-              </a:cxn>
-            </a:cxnLst>
-            <a:rect l="l" t="t" r="r" b="b"/>
-            <a:pathLst>
-              <a:path w="2568285" h="1221594">
-                <a:moveTo>
-                  <a:pt x="2568248" y="0"/>
-                </a:moveTo>
-                <a:cubicBezTo>
-                  <a:pt x="2575743" y="1308100"/>
-                  <a:pt x="1455772" y="1197778"/>
-                  <a:pt x="1033850" y="1214437"/>
-                </a:cubicBezTo>
-                <a:cubicBezTo>
-                  <a:pt x="610284" y="1231161"/>
-                  <a:pt x="-32262" y="1290638"/>
-                  <a:pt x="1260" y="357187"/>
-                </a:cubicBezTo>
-              </a:path>
-            </a:pathLst>
-          </a:custGeom>
-          <a:noFill/>
-          <a:ln w="57150">
+          </a:prstGeom>
+          <a:solidFill>
+            <a:srgbClr val="324D7A"/>
+          </a:solidFill>
+          <a:ln w="19050" cap="flat" cmpd="sng" algn="ctr">
             <a:solidFill>
-              <a:srgbClr val="92D050">
-                <a:alpha val="85098"/>
-              </a:srgbClr>
+              <a:srgbClr val="1F314F"/>
             </a:solidFill>
-            <a:headEnd type="none" w="med" len="med"/>
-            <a:tailEnd type="triangle" w="med" len="med"/>
+            <a:prstDash val="solid"/>
+            <a:miter lim="800000"/>
           </a:ln>
+          <a:effectLst/>
         </p:spPr>
-        <p:style>
-          <a:lnRef idx="2">
-            <a:schemeClr val="accent1">
-              <a:shade val="50000"/>
-            </a:schemeClr>
-          </a:lnRef>
-          <a:fillRef idx="1">
-            <a:schemeClr val="accent1"/>
-          </a:fillRef>
-          <a:effectRef idx="0">
-            <a:schemeClr val="accent1"/>
-          </a:effectRef>
-          <a:fontRef idx="minor">
-            <a:schemeClr val="lt1"/>
-          </a:fontRef>
-        </p:style>
         <p:txBody>
-          <a:bodyPr rtlCol="0" anchor="ctr"/>
-          <a:lstStyle/>
+          <a:bodyPr lIns="0" tIns="0" rIns="0" bIns="0" rtlCol="0" anchor="ctr"/>
+          <a:lstStyle>
+            <a:defPPr>
+              <a:defRPr lang="en-US"/>
+            </a:defPPr>
+            <a:lvl1pPr marL="0" algn="l" defTabSz="914400" rtl="0" eaLnBrk="1" latinLnBrk="0" hangingPunct="1">
+              <a:defRPr sz="1800" kern="1200">
+                <a:solidFill>
+                  <a:schemeClr val="tx1"/>
+                </a:solidFill>
+                <a:latin typeface="+mn-lt"/>
+                <a:ea typeface="+mn-ea"/>
+                <a:cs typeface="+mn-cs"/>
+              </a:defRPr>
+            </a:lvl1pPr>
+            <a:lvl2pPr marL="457200" algn="l" defTabSz="914400" rtl="0" eaLnBrk="1" latinLnBrk="0" hangingPunct="1">
+              <a:defRPr sz="1800" kern="1200">
+                <a:solidFill>
+                  <a:schemeClr val="tx1"/>
+                </a:solidFill>
+                <a:latin typeface="+mn-lt"/>
+                <a:ea typeface="+mn-ea"/>
+                <a:cs typeface="+mn-cs"/>
+              </a:defRPr>
+            </a:lvl2pPr>
+            <a:lvl3pPr marL="914400" algn="l" defTabSz="914400" rtl="0" eaLnBrk="1" latinLnBrk="0" hangingPunct="1">
+              <a:defRPr sz="1800" kern="1200">
+                <a:solidFill>
+                  <a:schemeClr val="tx1"/>
+                </a:solidFill>
+                <a:latin typeface="+mn-lt"/>
+                <a:ea typeface="+mn-ea"/>
+                <a:cs typeface="+mn-cs"/>
+              </a:defRPr>
+            </a:lvl3pPr>
+            <a:lvl4pPr marL="1371600" algn="l" defTabSz="914400" rtl="0" eaLnBrk="1" latinLnBrk="0" hangingPunct="1">
+              <a:defRPr sz="1800" kern="1200">
+                <a:solidFill>
+                  <a:schemeClr val="tx1"/>
+                </a:solidFill>
+                <a:latin typeface="+mn-lt"/>
+                <a:ea typeface="+mn-ea"/>
+                <a:cs typeface="+mn-cs"/>
+              </a:defRPr>
+            </a:lvl4pPr>
+            <a:lvl5pPr marL="1828800" algn="l" defTabSz="914400" rtl="0" eaLnBrk="1" latinLnBrk="0" hangingPunct="1">
+              <a:defRPr sz="1800" kern="1200">
+                <a:solidFill>
+                  <a:schemeClr val="tx1"/>
+                </a:solidFill>
+                <a:latin typeface="+mn-lt"/>
+                <a:ea typeface="+mn-ea"/>
+                <a:cs typeface="+mn-cs"/>
+              </a:defRPr>
+            </a:lvl5pPr>
+            <a:lvl6pPr marL="2286000" algn="l" defTabSz="914400" rtl="0" eaLnBrk="1" latinLnBrk="0" hangingPunct="1">
+              <a:defRPr sz="1800" kern="1200">
+                <a:solidFill>
+                  <a:schemeClr val="tx1"/>
+                </a:solidFill>
+                <a:latin typeface="+mn-lt"/>
+                <a:ea typeface="+mn-ea"/>
+                <a:cs typeface="+mn-cs"/>
+              </a:defRPr>
+            </a:lvl6pPr>
+            <a:lvl7pPr marL="2743200" algn="l" defTabSz="914400" rtl="0" eaLnBrk="1" latinLnBrk="0" hangingPunct="1">
+              <a:defRPr sz="1800" kern="1200">
+                <a:solidFill>
+                  <a:schemeClr val="tx1"/>
+                </a:solidFill>
+                <a:latin typeface="+mn-lt"/>
+                <a:ea typeface="+mn-ea"/>
+                <a:cs typeface="+mn-cs"/>
+              </a:defRPr>
+            </a:lvl7pPr>
+            <a:lvl8pPr marL="3200400" algn="l" defTabSz="914400" rtl="0" eaLnBrk="1" latinLnBrk="0" hangingPunct="1">
+              <a:defRPr sz="1800" kern="1200">
+                <a:solidFill>
+                  <a:schemeClr val="tx1"/>
+                </a:solidFill>
+                <a:latin typeface="+mn-lt"/>
+                <a:ea typeface="+mn-ea"/>
+                <a:cs typeface="+mn-cs"/>
+              </a:defRPr>
+            </a:lvl8pPr>
+            <a:lvl9pPr marL="3657600" algn="l" defTabSz="914400" rtl="0" eaLnBrk="1" latinLnBrk="0" hangingPunct="1">
+              <a:defRPr sz="1800" kern="1200">
+                <a:solidFill>
+                  <a:schemeClr val="tx1"/>
+                </a:solidFill>
+                <a:latin typeface="+mn-lt"/>
+                <a:ea typeface="+mn-ea"/>
+                <a:cs typeface="+mn-cs"/>
+              </a:defRPr>
+            </a:lvl9pPr>
+          </a:lstStyle>
           <a:p>
-            <a:pPr algn="ctr"/>
-            <a:endParaRPr lang="en-US"/>
+            <a:pPr algn="ctr">
+              <a:buClrTx/>
+              <a:buFontTx/>
+              <a:buNone/>
+            </a:pPr>
+            <a:r>
+              <a:rPr lang="en-US" sz="1100" kern="0" dirty="0">
+                <a:solidFill>
+                  <a:prstClr val="white"/>
+                </a:solidFill>
+                <a:latin typeface="Calibri" panose="020F0502020204030204"/>
+              </a:rPr>
+              <a:t>micro-ROS</a:t>
+            </a:r>
+          </a:p>
+          <a:p>
+            <a:pPr algn="ctr">
+              <a:buClrTx/>
+              <a:buFontTx/>
+              <a:buNone/>
+            </a:pPr>
+            <a:r>
+              <a:rPr lang="en-US" sz="1100" kern="0" dirty="0">
+                <a:solidFill>
+                  <a:prstClr val="white"/>
+                </a:solidFill>
+                <a:latin typeface="Calibri" panose="020F0502020204030204"/>
+              </a:rPr>
+              <a:t>common</a:t>
+            </a:r>
+          </a:p>
+          <a:p>
+            <a:pPr algn="ctr">
+              <a:buClrTx/>
+              <a:buFontTx/>
+              <a:buNone/>
+            </a:pPr>
+            <a:r>
+              <a:rPr lang="en-US" sz="1100" kern="0" dirty="0">
+                <a:solidFill>
+                  <a:prstClr val="white"/>
+                </a:solidFill>
+                <a:latin typeface="Calibri" panose="020F0502020204030204"/>
+              </a:rPr>
+              <a:t>diagnostics</a:t>
+            </a:r>
           </a:p>
         </p:txBody>
       </p:sp>
       <p:sp>
         <p:nvSpPr>
-          <p:cNvPr id="38" name="Freeform: Shape 37">
+          <p:cNvPr id="25" name="Rectangle 24">
             <a:extLst>
               <a:ext uri="{FF2B5EF4-FFF2-40B4-BE49-F238E27FC236}">
-                <a16:creationId xmlns:a16="http://schemas.microsoft.com/office/drawing/2014/main" id="{68E8051F-ACDC-4332-8516-C75CF8F54D92}"/>
+                <a16:creationId xmlns:a16="http://schemas.microsoft.com/office/drawing/2014/main" id="{D7B03E5B-A288-4B82-A9A5-E7ACA0AAB28C}"/>
               </a:ext>
             </a:extLst>
           </p:cNvPr>
@@ -17572,258 +17126,462 @@
         </p:nvSpPr>
         <p:spPr>
           <a:xfrm>
-            <a:off x="2571750" y="3698080"/>
-            <a:ext cx="2400482" cy="1155330"/>
+            <a:off x="7358228" y="3928547"/>
+            <a:ext cx="546856" cy="148153"/>
           </a:xfrm>
-          <a:custGeom>
+          <a:prstGeom prst="rect">
             <a:avLst/>
-            <a:gdLst>
-              <a:gd name="connsiteX0" fmla="*/ 2653990 w 2882672"/>
-              <a:gd name="connsiteY0" fmla="*/ 0 h 896469"/>
-              <a:gd name="connsiteX1" fmla="*/ 2658752 w 2882672"/>
-              <a:gd name="connsiteY1" fmla="*/ 671512 h 896469"/>
-              <a:gd name="connsiteX2" fmla="*/ 315602 w 2882672"/>
-              <a:gd name="connsiteY2" fmla="*/ 876300 h 896469"/>
-              <a:gd name="connsiteX3" fmla="*/ 87002 w 2882672"/>
-              <a:gd name="connsiteY3" fmla="*/ 242887 h 896469"/>
-              <a:gd name="connsiteX0" fmla="*/ 2617314 w 2845996"/>
-              <a:gd name="connsiteY0" fmla="*/ 0 h 896469"/>
-              <a:gd name="connsiteX1" fmla="*/ 2622076 w 2845996"/>
-              <a:gd name="connsiteY1" fmla="*/ 671512 h 896469"/>
-              <a:gd name="connsiteX2" fmla="*/ 278926 w 2845996"/>
-              <a:gd name="connsiteY2" fmla="*/ 876300 h 896469"/>
-              <a:gd name="connsiteX3" fmla="*/ 50326 w 2845996"/>
-              <a:gd name="connsiteY3" fmla="*/ 242887 h 896469"/>
-              <a:gd name="connsiteX0" fmla="*/ 2567080 w 2732015"/>
-              <a:gd name="connsiteY0" fmla="*/ 0 h 967770"/>
-              <a:gd name="connsiteX1" fmla="*/ 2571842 w 2732015"/>
-              <a:gd name="connsiteY1" fmla="*/ 671512 h 967770"/>
-              <a:gd name="connsiteX2" fmla="*/ 1157379 w 2732015"/>
-              <a:gd name="connsiteY2" fmla="*/ 952500 h 967770"/>
-              <a:gd name="connsiteX3" fmla="*/ 92 w 2732015"/>
-              <a:gd name="connsiteY3" fmla="*/ 242887 h 967770"/>
-              <a:gd name="connsiteX0" fmla="*/ 2567076 w 2732011"/>
-              <a:gd name="connsiteY0" fmla="*/ 0 h 952629"/>
-              <a:gd name="connsiteX1" fmla="*/ 2571838 w 2732011"/>
-              <a:gd name="connsiteY1" fmla="*/ 671512 h 952629"/>
-              <a:gd name="connsiteX2" fmla="*/ 1157375 w 2732011"/>
-              <a:gd name="connsiteY2" fmla="*/ 952500 h 952629"/>
-              <a:gd name="connsiteX3" fmla="*/ 88 w 2732011"/>
-              <a:gd name="connsiteY3" fmla="*/ 242887 h 952629"/>
-              <a:gd name="connsiteX0" fmla="*/ 2567076 w 2567076"/>
-              <a:gd name="connsiteY0" fmla="*/ 0 h 952500"/>
-              <a:gd name="connsiteX1" fmla="*/ 1157375 w 2567076"/>
-              <a:gd name="connsiteY1" fmla="*/ 952500 h 952500"/>
-              <a:gd name="connsiteX2" fmla="*/ 88 w 2567076"/>
-              <a:gd name="connsiteY2" fmla="*/ 242887 h 952500"/>
-              <a:gd name="connsiteX0" fmla="*/ 2567076 w 2567389"/>
-              <a:gd name="connsiteY0" fmla="*/ 0 h 952500"/>
-              <a:gd name="connsiteX1" fmla="*/ 1157375 w 2567389"/>
-              <a:gd name="connsiteY1" fmla="*/ 952500 h 952500"/>
-              <a:gd name="connsiteX2" fmla="*/ 88 w 2567389"/>
-              <a:gd name="connsiteY2" fmla="*/ 242887 h 952500"/>
-              <a:gd name="connsiteX0" fmla="*/ 2567076 w 2567390"/>
-              <a:gd name="connsiteY0" fmla="*/ 0 h 952558"/>
-              <a:gd name="connsiteX1" fmla="*/ 1157375 w 2567390"/>
-              <a:gd name="connsiteY1" fmla="*/ 952500 h 952558"/>
-              <a:gd name="connsiteX2" fmla="*/ 88 w 2567390"/>
-              <a:gd name="connsiteY2" fmla="*/ 242887 h 952558"/>
-              <a:gd name="connsiteX0" fmla="*/ 2567076 w 2567076"/>
-              <a:gd name="connsiteY0" fmla="*/ 0 h 976463"/>
-              <a:gd name="connsiteX1" fmla="*/ 1157375 w 2567076"/>
-              <a:gd name="connsiteY1" fmla="*/ 952500 h 976463"/>
-              <a:gd name="connsiteX2" fmla="*/ 88 w 2567076"/>
-              <a:gd name="connsiteY2" fmla="*/ 242887 h 976463"/>
-              <a:gd name="connsiteX0" fmla="*/ 2566988 w 2566988"/>
-              <a:gd name="connsiteY0" fmla="*/ 0 h 976463"/>
-              <a:gd name="connsiteX1" fmla="*/ 1157287 w 2566988"/>
-              <a:gd name="connsiteY1" fmla="*/ 952500 h 976463"/>
-              <a:gd name="connsiteX2" fmla="*/ 0 w 2566988"/>
-              <a:gd name="connsiteY2" fmla="*/ 242887 h 976463"/>
-              <a:gd name="connsiteX0" fmla="*/ 2566988 w 2566988"/>
-              <a:gd name="connsiteY0" fmla="*/ 0 h 999455"/>
-              <a:gd name="connsiteX1" fmla="*/ 1119187 w 2566988"/>
-              <a:gd name="connsiteY1" fmla="*/ 981075 h 999455"/>
-              <a:gd name="connsiteX2" fmla="*/ 0 w 2566988"/>
-              <a:gd name="connsiteY2" fmla="*/ 242887 h 999455"/>
-              <a:gd name="connsiteX0" fmla="*/ 2566988 w 2566988"/>
-              <a:gd name="connsiteY0" fmla="*/ 0 h 999303"/>
-              <a:gd name="connsiteX1" fmla="*/ 1119187 w 2566988"/>
-              <a:gd name="connsiteY1" fmla="*/ 981075 h 999303"/>
-              <a:gd name="connsiteX2" fmla="*/ 0 w 2566988"/>
-              <a:gd name="connsiteY2" fmla="*/ 242887 h 999303"/>
-              <a:gd name="connsiteX0" fmla="*/ 2566988 w 2566988"/>
-              <a:gd name="connsiteY0" fmla="*/ 0 h 999303"/>
-              <a:gd name="connsiteX1" fmla="*/ 1119187 w 2566988"/>
-              <a:gd name="connsiteY1" fmla="*/ 981075 h 999303"/>
-              <a:gd name="connsiteX2" fmla="*/ 0 w 2566988"/>
-              <a:gd name="connsiteY2" fmla="*/ 242887 h 999303"/>
-              <a:gd name="connsiteX0" fmla="*/ 2566988 w 2567163"/>
-              <a:gd name="connsiteY0" fmla="*/ 0 h 983879"/>
-              <a:gd name="connsiteX1" fmla="*/ 1119187 w 2567163"/>
-              <a:gd name="connsiteY1" fmla="*/ 981075 h 983879"/>
-              <a:gd name="connsiteX2" fmla="*/ 0 w 2567163"/>
-              <a:gd name="connsiteY2" fmla="*/ 242887 h 983879"/>
-              <a:gd name="connsiteX0" fmla="*/ 2566988 w 2567168"/>
-              <a:gd name="connsiteY0" fmla="*/ 0 h 1121055"/>
-              <a:gd name="connsiteX1" fmla="*/ 1119187 w 2567168"/>
-              <a:gd name="connsiteY1" fmla="*/ 1100138 h 1121055"/>
-              <a:gd name="connsiteX2" fmla="*/ 0 w 2567168"/>
-              <a:gd name="connsiteY2" fmla="*/ 361950 h 1121055"/>
-              <a:gd name="connsiteX0" fmla="*/ 2572092 w 2572271"/>
-              <a:gd name="connsiteY0" fmla="*/ 0 h 1138796"/>
-              <a:gd name="connsiteX1" fmla="*/ 1119187 w 2572271"/>
-              <a:gd name="connsiteY1" fmla="*/ 1116807 h 1138796"/>
-              <a:gd name="connsiteX2" fmla="*/ 0 w 2572271"/>
-              <a:gd name="connsiteY2" fmla="*/ 378619 h 1138796"/>
-              <a:gd name="connsiteX0" fmla="*/ 2572092 w 2572271"/>
-              <a:gd name="connsiteY0" fmla="*/ 0 h 1138796"/>
-              <a:gd name="connsiteX1" fmla="*/ 1119187 w 2572271"/>
-              <a:gd name="connsiteY1" fmla="*/ 1116807 h 1138796"/>
-              <a:gd name="connsiteX2" fmla="*/ 0 w 2572271"/>
-              <a:gd name="connsiteY2" fmla="*/ 378619 h 1138796"/>
-              <a:gd name="connsiteX0" fmla="*/ 2572092 w 2572271"/>
-              <a:gd name="connsiteY0" fmla="*/ 0 h 1138796"/>
-              <a:gd name="connsiteX1" fmla="*/ 1119187 w 2572271"/>
-              <a:gd name="connsiteY1" fmla="*/ 1116807 h 1138796"/>
-              <a:gd name="connsiteX2" fmla="*/ 0 w 2572271"/>
-              <a:gd name="connsiteY2" fmla="*/ 378619 h 1138796"/>
-              <a:gd name="connsiteX0" fmla="*/ 2572092 w 2572271"/>
-              <a:gd name="connsiteY0" fmla="*/ 0 h 1121535"/>
-              <a:gd name="connsiteX1" fmla="*/ 1119187 w 2572271"/>
-              <a:gd name="connsiteY1" fmla="*/ 1116807 h 1121535"/>
-              <a:gd name="connsiteX2" fmla="*/ 0 w 2572271"/>
-              <a:gd name="connsiteY2" fmla="*/ 378619 h 1121535"/>
-              <a:gd name="connsiteX0" fmla="*/ 2572092 w 2572271"/>
-              <a:gd name="connsiteY0" fmla="*/ 0 h 1155619"/>
-              <a:gd name="connsiteX1" fmla="*/ 1121739 w 2572271"/>
-              <a:gd name="connsiteY1" fmla="*/ 1152526 h 1155619"/>
-              <a:gd name="connsiteX2" fmla="*/ 0 w 2572271"/>
-              <a:gd name="connsiteY2" fmla="*/ 378619 h 1155619"/>
-              <a:gd name="connsiteX0" fmla="*/ 2572092 w 2572272"/>
-              <a:gd name="connsiteY0" fmla="*/ 0 h 1155330"/>
-              <a:gd name="connsiteX1" fmla="*/ 1121739 w 2572272"/>
-              <a:gd name="connsiteY1" fmla="*/ 1152526 h 1155330"/>
-              <a:gd name="connsiteX2" fmla="*/ 0 w 2572272"/>
-              <a:gd name="connsiteY2" fmla="*/ 378619 h 1155330"/>
-            </a:gdLst>
-            <a:ahLst/>
-            <a:cxnLst>
-              <a:cxn ang="0">
-                <a:pos x="connsiteX0" y="connsiteY0"/>
-              </a:cxn>
-              <a:cxn ang="0">
-                <a:pos x="connsiteX1" y="connsiteY1"/>
-              </a:cxn>
-              <a:cxn ang="0">
-                <a:pos x="connsiteX2" y="connsiteY2"/>
-              </a:cxn>
-            </a:cxnLst>
-            <a:rect l="l" t="t" r="r" b="b"/>
-            <a:pathLst>
-              <a:path w="2572272" h="1155330">
-                <a:moveTo>
-                  <a:pt x="2572092" y="0"/>
-                </a:moveTo>
-                <a:cubicBezTo>
-                  <a:pt x="2587967" y="1248568"/>
-                  <a:pt x="1552971" y="1156098"/>
-                  <a:pt x="1121739" y="1152526"/>
-                </a:cubicBezTo>
-                <a:cubicBezTo>
-                  <a:pt x="690507" y="1148954"/>
-                  <a:pt x="0" y="1154907"/>
-                  <a:pt x="0" y="378619"/>
-                </a:cubicBezTo>
-              </a:path>
-            </a:pathLst>
-          </a:custGeom>
-          <a:noFill/>
-          <a:ln w="57150">
+          </a:prstGeom>
+          <a:solidFill>
+            <a:schemeClr val="accent5">
+              <a:lumMod val="50000"/>
+            </a:schemeClr>
+          </a:solidFill>
+          <a:ln w="19050" cap="flat" cmpd="sng" algn="ctr">
             <a:solidFill>
-              <a:srgbClr val="92D050">
-                <a:alpha val="85098"/>
-              </a:srgbClr>
+              <a:schemeClr val="tx1"/>
+            </a:solidFill>
+            <a:prstDash val="solid"/>
+            <a:miter lim="800000"/>
+          </a:ln>
+          <a:effectLst/>
+        </p:spPr>
+        <p:txBody>
+          <a:bodyPr lIns="0" tIns="0" rIns="0" bIns="0" rtlCol="0" anchor="ctr"/>
+          <a:lstStyle/>
+          <a:p>
+            <a:pPr algn="ctr">
+              <a:buClrTx/>
+            </a:pPr>
+            <a:r>
+              <a:rPr lang="en-US" sz="1000" dirty="0">
+                <a:solidFill>
+                  <a:schemeClr val="bg1"/>
+                </a:solidFill>
+                <a:latin typeface="Calibri" panose="020F0502020204030204"/>
+              </a:rPr>
+              <a:t>Updater</a:t>
+            </a:r>
+          </a:p>
+        </p:txBody>
+      </p:sp>
+      <p:cxnSp>
+        <p:nvCxnSpPr>
+          <p:cNvPr id="5" name="Straight Arrow Connector 4">
+            <a:extLst>
+              <a:ext uri="{FF2B5EF4-FFF2-40B4-BE49-F238E27FC236}">
+                <a16:creationId xmlns:a16="http://schemas.microsoft.com/office/drawing/2014/main" id="{A2323D71-D7C5-48FA-BC8F-5B7D42ED3061}"/>
+              </a:ext>
+            </a:extLst>
+          </p:cNvPr>
+          <p:cNvCxnSpPr>
+            <a:cxnSpLocks/>
+            <a:stCxn id="41" idx="2"/>
+            <a:endCxn id="35" idx="0"/>
+          </p:cNvCxnSpPr>
+          <p:nvPr/>
+        </p:nvCxnSpPr>
+        <p:spPr>
+          <a:xfrm>
+            <a:off x="5159190" y="3734437"/>
+            <a:ext cx="3644" cy="194110"/>
+          </a:xfrm>
+          <a:prstGeom prst="straightConnector1">
+            <a:avLst/>
+          </a:prstGeom>
+          <a:ln w="19050">
+            <a:solidFill>
+              <a:srgbClr val="C00000"/>
             </a:solidFill>
             <a:headEnd type="none" w="med" len="med"/>
             <a:tailEnd type="triangle" w="med" len="med"/>
           </a:ln>
         </p:spPr>
         <p:style>
-          <a:lnRef idx="2">
-            <a:schemeClr val="accent1">
-              <a:shade val="50000"/>
-            </a:schemeClr>
+          <a:lnRef idx="1">
+            <a:schemeClr val="accent1"/>
           </a:lnRef>
-          <a:fillRef idx="1">
+          <a:fillRef idx="0">
             <a:schemeClr val="accent1"/>
           </a:fillRef>
           <a:effectRef idx="0">
             <a:schemeClr val="accent1"/>
           </a:effectRef>
           <a:fontRef idx="minor">
-            <a:schemeClr val="lt1"/>
+            <a:schemeClr val="tx1"/>
           </a:fontRef>
         </p:style>
-        <p:txBody>
-          <a:bodyPr rtlCol="0" anchor="ctr"/>
-          <a:lstStyle/>
-          <a:p>
-            <a:pPr algn="ctr"/>
-            <a:endParaRPr lang="en-US" dirty="0"/>
-          </a:p>
-        </p:txBody>
-      </p:sp>
+      </p:cxnSp>
       <p:cxnSp>
         <p:nvCxnSpPr>
-          <p:cNvPr id="6" name="Straight Arrow Connector 5">
+          <p:cNvPr id="8" name="Straight Arrow Connector 7">
             <a:extLst>
               <a:ext uri="{FF2B5EF4-FFF2-40B4-BE49-F238E27FC236}">
-                <a16:creationId xmlns:a16="http://schemas.microsoft.com/office/drawing/2014/main" id="{F1C9E167-6EF7-44F5-ABA5-05954EE38FFD}"/>
+                <a16:creationId xmlns:a16="http://schemas.microsoft.com/office/drawing/2014/main" id="{5CDCCD4F-98A4-41E6-8963-43CEF4C5ACC8}"/>
               </a:ext>
             </a:extLst>
           </p:cNvPr>
           <p:cNvCxnSpPr>
             <a:cxnSpLocks/>
+            <a:stCxn id="74" idx="2"/>
+            <a:endCxn id="2" idx="0"/>
           </p:cNvCxnSpPr>
           <p:nvPr/>
         </p:nvCxnSpPr>
         <p:spPr>
-          <a:xfrm flipH="1" flipV="1">
-            <a:off x="2396746" y="3671546"/>
-            <a:ext cx="1" cy="266527"/>
+          <a:xfrm flipH="1">
+            <a:off x="6496554" y="3736798"/>
+            <a:ext cx="1" cy="198010"/>
           </a:xfrm>
           <a:prstGeom prst="straightConnector1">
             <a:avLst/>
           </a:prstGeom>
-          <a:noFill/>
-          <a:ln w="57150">
+          <a:ln w="19050">
             <a:solidFill>
-              <a:srgbClr val="92D050">
-                <a:alpha val="85098"/>
-              </a:srgbClr>
+              <a:srgbClr val="C00000"/>
             </a:solidFill>
             <a:headEnd type="none" w="med" len="med"/>
             <a:tailEnd type="triangle" w="med" len="med"/>
           </a:ln>
         </p:spPr>
         <p:style>
-          <a:lnRef idx="2">
-            <a:schemeClr val="accent1">
-              <a:shade val="50000"/>
-            </a:schemeClr>
+          <a:lnRef idx="1">
+            <a:schemeClr val="accent1"/>
           </a:lnRef>
-          <a:fillRef idx="1">
+          <a:fillRef idx="0">
             <a:schemeClr val="accent1"/>
           </a:fillRef>
           <a:effectRef idx="0">
             <a:schemeClr val="accent1"/>
           </a:effectRef>
           <a:fontRef idx="minor">
-            <a:schemeClr val="lt1"/>
+            <a:schemeClr val="tx1"/>
           </a:fontRef>
         </p:style>
       </p:cxnSp>
+      <p:cxnSp>
+        <p:nvCxnSpPr>
+          <p:cNvPr id="10" name="Straight Arrow Connector 9">
+            <a:extLst>
+              <a:ext uri="{FF2B5EF4-FFF2-40B4-BE49-F238E27FC236}">
+                <a16:creationId xmlns:a16="http://schemas.microsoft.com/office/drawing/2014/main" id="{97BC9218-E73E-488D-B51F-BEC4176CA00D}"/>
+              </a:ext>
+            </a:extLst>
+          </p:cNvPr>
+          <p:cNvCxnSpPr>
+            <a:cxnSpLocks/>
+            <a:stCxn id="24" idx="2"/>
+            <a:endCxn id="25" idx="0"/>
+          </p:cNvCxnSpPr>
+          <p:nvPr/>
+        </p:nvCxnSpPr>
+        <p:spPr>
+          <a:xfrm>
+            <a:off x="7631656" y="3736595"/>
+            <a:ext cx="0" cy="191952"/>
+          </a:xfrm>
+          <a:prstGeom prst="straightConnector1">
+            <a:avLst/>
+          </a:prstGeom>
+          <a:ln w="19050">
+            <a:solidFill>
+              <a:srgbClr val="C00000"/>
+            </a:solidFill>
+            <a:headEnd type="none" w="med" len="med"/>
+            <a:tailEnd type="triangle" w="med" len="med"/>
+          </a:ln>
+        </p:spPr>
+        <p:style>
+          <a:lnRef idx="1">
+            <a:schemeClr val="accent1"/>
+          </a:lnRef>
+          <a:fillRef idx="0">
+            <a:schemeClr val="accent1"/>
+          </a:fillRef>
+          <a:effectRef idx="0">
+            <a:schemeClr val="accent1"/>
+          </a:effectRef>
+          <a:fontRef idx="minor">
+            <a:schemeClr val="tx1"/>
+          </a:fontRef>
+        </p:style>
+      </p:cxnSp>
+      <p:cxnSp>
+        <p:nvCxnSpPr>
+          <p:cNvPr id="21" name="Straight Arrow Connector 20">
+            <a:extLst>
+              <a:ext uri="{FF2B5EF4-FFF2-40B4-BE49-F238E27FC236}">
+                <a16:creationId xmlns:a16="http://schemas.microsoft.com/office/drawing/2014/main" id="{D139A461-CBBC-4CF4-8F7A-0CDD0656D842}"/>
+              </a:ext>
+            </a:extLst>
+          </p:cNvPr>
+          <p:cNvCxnSpPr>
+            <a:stCxn id="34" idx="0"/>
+            <a:endCxn id="77" idx="2"/>
+          </p:cNvCxnSpPr>
+          <p:nvPr/>
+        </p:nvCxnSpPr>
+        <p:spPr>
+          <a:xfrm flipV="1">
+            <a:off x="2355176" y="3736595"/>
+            <a:ext cx="1" cy="191952"/>
+          </a:xfrm>
+          <a:prstGeom prst="straightConnector1">
+            <a:avLst/>
+          </a:prstGeom>
+          <a:ln w="19050">
+            <a:solidFill>
+              <a:srgbClr val="C00000"/>
+            </a:solidFill>
+            <a:headEnd type="none" w="med" len="med"/>
+            <a:tailEnd type="triangle" w="med" len="med"/>
+          </a:ln>
+        </p:spPr>
+        <p:style>
+          <a:lnRef idx="1">
+            <a:schemeClr val="accent1"/>
+          </a:lnRef>
+          <a:fillRef idx="0">
+            <a:schemeClr val="accent1"/>
+          </a:fillRef>
+          <a:effectRef idx="0">
+            <a:schemeClr val="accent1"/>
+          </a:effectRef>
+          <a:fontRef idx="minor">
+            <a:schemeClr val="tx1"/>
+          </a:fontRef>
+        </p:style>
+      </p:cxnSp>
+      <p:cxnSp>
+        <p:nvCxnSpPr>
+          <p:cNvPr id="27" name="Straight Arrow Connector 26">
+            <a:extLst>
+              <a:ext uri="{FF2B5EF4-FFF2-40B4-BE49-F238E27FC236}">
+                <a16:creationId xmlns:a16="http://schemas.microsoft.com/office/drawing/2014/main" id="{59D05FBA-7644-4A1C-9DEB-2596772659AD}"/>
+              </a:ext>
+            </a:extLst>
+          </p:cNvPr>
+          <p:cNvCxnSpPr>
+            <a:stCxn id="87" idx="1"/>
+            <a:endCxn id="75" idx="3"/>
+          </p:cNvCxnSpPr>
+          <p:nvPr/>
+        </p:nvCxnSpPr>
+        <p:spPr>
+          <a:xfrm flipH="1">
+            <a:off x="3789942" y="4813366"/>
+            <a:ext cx="880499" cy="136"/>
+          </a:xfrm>
+          <a:prstGeom prst="straightConnector1">
+            <a:avLst/>
+          </a:prstGeom>
+          <a:ln w="19050">
+            <a:solidFill>
+              <a:srgbClr val="C00000"/>
+            </a:solidFill>
+            <a:headEnd type="none" w="med" len="med"/>
+            <a:tailEnd type="triangle" w="med" len="med"/>
+          </a:ln>
+        </p:spPr>
+        <p:style>
+          <a:lnRef idx="1">
+            <a:schemeClr val="accent1"/>
+          </a:lnRef>
+          <a:fillRef idx="0">
+            <a:schemeClr val="accent1"/>
+          </a:fillRef>
+          <a:effectRef idx="0">
+            <a:schemeClr val="accent1"/>
+          </a:effectRef>
+          <a:fontRef idx="minor">
+            <a:schemeClr val="tx1"/>
+          </a:fontRef>
+        </p:style>
+      </p:cxnSp>
+      <p:sp>
+        <p:nvSpPr>
+          <p:cNvPr id="26" name="TextBox 78">
+            <a:extLst>
+              <a:ext uri="{FF2B5EF4-FFF2-40B4-BE49-F238E27FC236}">
+                <a16:creationId xmlns:a16="http://schemas.microsoft.com/office/drawing/2014/main" id="{00E4C72D-ED90-412D-8B60-7A4D0DFB3ADD}"/>
+              </a:ext>
+            </a:extLst>
+          </p:cNvPr>
+          <p:cNvSpPr txBox="1"/>
+          <p:nvPr/>
+        </p:nvSpPr>
+        <p:spPr>
+          <a:xfrm>
+            <a:off x="3937151" y="4605617"/>
+            <a:ext cx="586080" cy="415498"/>
+          </a:xfrm>
+          <a:prstGeom prst="rect">
+            <a:avLst/>
+          </a:prstGeom>
+          <a:solidFill>
+            <a:schemeClr val="bg1"/>
+          </a:solidFill>
+          <a:ln>
+            <a:solidFill>
+              <a:schemeClr val="tx1"/>
+            </a:solidFill>
+          </a:ln>
+        </p:spPr>
+        <p:txBody>
+          <a:bodyPr wrap="square" rtlCol="0">
+            <a:spAutoFit/>
+          </a:bodyPr>
+          <a:lstStyle>
+            <a:defPPr>
+              <a:defRPr lang="en-US"/>
+            </a:defPPr>
+            <a:lvl1pPr marL="0" algn="l" defTabSz="914400" rtl="0" eaLnBrk="1" latinLnBrk="0" hangingPunct="1">
+              <a:defRPr sz="1800" kern="1200">
+                <a:solidFill>
+                  <a:schemeClr val="tx1"/>
+                </a:solidFill>
+                <a:latin typeface="+mn-lt"/>
+                <a:ea typeface="+mn-ea"/>
+                <a:cs typeface="+mn-cs"/>
+              </a:defRPr>
+            </a:lvl1pPr>
+            <a:lvl2pPr marL="457200" algn="l" defTabSz="914400" rtl="0" eaLnBrk="1" latinLnBrk="0" hangingPunct="1">
+              <a:defRPr sz="1800" kern="1200">
+                <a:solidFill>
+                  <a:schemeClr val="tx1"/>
+                </a:solidFill>
+                <a:latin typeface="+mn-lt"/>
+                <a:ea typeface="+mn-ea"/>
+                <a:cs typeface="+mn-cs"/>
+              </a:defRPr>
+            </a:lvl2pPr>
+            <a:lvl3pPr marL="914400" algn="l" defTabSz="914400" rtl="0" eaLnBrk="1" latinLnBrk="0" hangingPunct="1">
+              <a:defRPr sz="1800" kern="1200">
+                <a:solidFill>
+                  <a:schemeClr val="tx1"/>
+                </a:solidFill>
+                <a:latin typeface="+mn-lt"/>
+                <a:ea typeface="+mn-ea"/>
+                <a:cs typeface="+mn-cs"/>
+              </a:defRPr>
+            </a:lvl3pPr>
+            <a:lvl4pPr marL="1371600" algn="l" defTabSz="914400" rtl="0" eaLnBrk="1" latinLnBrk="0" hangingPunct="1">
+              <a:defRPr sz="1800" kern="1200">
+                <a:solidFill>
+                  <a:schemeClr val="tx1"/>
+                </a:solidFill>
+                <a:latin typeface="+mn-lt"/>
+                <a:ea typeface="+mn-ea"/>
+                <a:cs typeface="+mn-cs"/>
+              </a:defRPr>
+            </a:lvl4pPr>
+            <a:lvl5pPr marL="1828800" algn="l" defTabSz="914400" rtl="0" eaLnBrk="1" latinLnBrk="0" hangingPunct="1">
+              <a:defRPr sz="1800" kern="1200">
+                <a:solidFill>
+                  <a:schemeClr val="tx1"/>
+                </a:solidFill>
+                <a:latin typeface="+mn-lt"/>
+                <a:ea typeface="+mn-ea"/>
+                <a:cs typeface="+mn-cs"/>
+              </a:defRPr>
+            </a:lvl5pPr>
+            <a:lvl6pPr marL="2286000" algn="l" defTabSz="914400" rtl="0" eaLnBrk="1" latinLnBrk="0" hangingPunct="1">
+              <a:defRPr sz="1800" kern="1200">
+                <a:solidFill>
+                  <a:schemeClr val="tx1"/>
+                </a:solidFill>
+                <a:latin typeface="+mn-lt"/>
+                <a:ea typeface="+mn-ea"/>
+                <a:cs typeface="+mn-cs"/>
+              </a:defRPr>
+            </a:lvl6pPr>
+            <a:lvl7pPr marL="2743200" algn="l" defTabSz="914400" rtl="0" eaLnBrk="1" latinLnBrk="0" hangingPunct="1">
+              <a:defRPr sz="1800" kern="1200">
+                <a:solidFill>
+                  <a:schemeClr val="tx1"/>
+                </a:solidFill>
+                <a:latin typeface="+mn-lt"/>
+                <a:ea typeface="+mn-ea"/>
+                <a:cs typeface="+mn-cs"/>
+              </a:defRPr>
+            </a:lvl7pPr>
+            <a:lvl8pPr marL="3200400" algn="l" defTabSz="914400" rtl="0" eaLnBrk="1" latinLnBrk="0" hangingPunct="1">
+              <a:defRPr sz="1800" kern="1200">
+                <a:solidFill>
+                  <a:schemeClr val="tx1"/>
+                </a:solidFill>
+                <a:latin typeface="+mn-lt"/>
+                <a:ea typeface="+mn-ea"/>
+                <a:cs typeface="+mn-cs"/>
+              </a:defRPr>
+            </a:lvl8pPr>
+            <a:lvl9pPr marL="3657600" algn="l" defTabSz="914400" rtl="0" eaLnBrk="1" latinLnBrk="0" hangingPunct="1">
+              <a:defRPr sz="1800" kern="1200">
+                <a:solidFill>
+                  <a:schemeClr val="tx1"/>
+                </a:solidFill>
+                <a:latin typeface="+mn-lt"/>
+                <a:ea typeface="+mn-ea"/>
+                <a:cs typeface="+mn-cs"/>
+              </a:defRPr>
+            </a:lvl9pPr>
+          </a:lstStyle>
+          <a:p>
+            <a:pPr algn="ctr">
+              <a:buClrTx/>
+              <a:buFontTx/>
+              <a:buNone/>
+            </a:pPr>
+            <a:r>
+              <a:rPr lang="en-US" sz="700" i="1" dirty="0">
+                <a:solidFill>
+                  <a:srgbClr val="000000"/>
+                </a:solidFill>
+                <a:latin typeface="Calibri" panose="020F0502020204030204"/>
+              </a:rPr>
+              <a:t>micro-ROS</a:t>
+            </a:r>
+          </a:p>
+          <a:p>
+            <a:pPr algn="ctr">
+              <a:buClrTx/>
+              <a:buFontTx/>
+              <a:buNone/>
+            </a:pPr>
+            <a:r>
+              <a:rPr lang="en-US" sz="700" i="1" dirty="0">
+                <a:solidFill>
+                  <a:srgbClr val="000000"/>
+                </a:solidFill>
+                <a:latin typeface="Calibri" panose="020F0502020204030204"/>
+              </a:rPr>
+              <a:t>diagnostic</a:t>
+            </a:r>
+          </a:p>
+          <a:p>
+            <a:pPr algn="ctr">
+              <a:buClrTx/>
+              <a:buFontTx/>
+              <a:buNone/>
+            </a:pPr>
+            <a:r>
+              <a:rPr lang="en-US" sz="700" i="1" dirty="0" err="1">
+                <a:solidFill>
+                  <a:srgbClr val="000000"/>
+                </a:solidFill>
+                <a:latin typeface="Calibri" panose="020F0502020204030204"/>
+              </a:rPr>
+              <a:t>msgs</a:t>
+            </a:r>
+            <a:endParaRPr lang="en-US" sz="700" i="1" dirty="0">
+              <a:solidFill>
+                <a:srgbClr val="000000"/>
+              </a:solidFill>
+              <a:latin typeface="Calibri" panose="020F0502020204030204"/>
+            </a:endParaRPr>
+          </a:p>
+        </p:txBody>
+      </p:sp>
     </p:spTree>
   </p:cSld>
   <p:clrMapOvr>

</xml_diff>